<commit_message>
vault backup: 2024-05-24 12:24:07
</commit_message>
<xml_diff>
--- a/06-ppt/discussion/0524.pptx
+++ b/06-ppt/discussion/0524.pptx
@@ -3,21 +3,22 @@
 <p:presentation xmlns:a="http://schemas.openxmlformats.org/drawingml/2006/main" xmlns:r="http://schemas.openxmlformats.org/officeDocument/2006/relationships" xmlns:p="http://schemas.openxmlformats.org/presentationml/2006/main" embedTrueTypeFonts="1" saveSubsetFonts="1">
   <p:sldMasterIdLst>
     <p:sldMasterId id="2147483648" r:id="rId1"/>
+    <p:sldMasterId id="2147483660" r:id="rId3"/>
   </p:sldMasterIdLst>
   <p:sldIdLst>
-    <p:sldId id="256" r:id="rId3"/>
-    <p:sldId id="257" r:id="rId4"/>
-    <p:sldId id="259" r:id="rId5"/>
-    <p:sldId id="260" r:id="rId6"/>
-    <p:sldId id="261" r:id="rId7"/>
-    <p:sldId id="262" r:id="rId8"/>
+    <p:sldId id="256" r:id="rId4"/>
+    <p:sldId id="264" r:id="rId5"/>
+    <p:sldId id="259" r:id="rId6"/>
+    <p:sldId id="260" r:id="rId7"/>
+    <p:sldId id="261" r:id="rId8"/>
+    <p:sldId id="262" r:id="rId9"/>
   </p:sldIdLst>
   <p:sldSz cx="12192000" cy="6858000"/>
   <p:notesSz cx="6858000" cy="9144000"/>
   <p:embeddedFontLst>
     <p:embeddedFont>
       <p:font typeface="DejaVu Math TeX Gyre" panose="02000503000000000000" charset="0"/>
-      <p:regular r:id="rId12"/>
+      <p:regular r:id="rId13"/>
     </p:embeddedFont>
   </p:embeddedFontLst>
   <p:defaultTextStyle>
@@ -118,7 +119,7 @@
   <p:extLst>
     <p:ext uri="{EFAFB233-063F-42B5-8137-9DF3F51BA10A}">
       <p15:sldGuideLst xmlns:p15="http://schemas.microsoft.com/office/powerpoint/2012/main">
-        <p15:guide id="1" orient="horz" pos="2174" userDrawn="1">
+        <p15:guide id="1" orient="horz" pos="2160" userDrawn="1">
           <p15:clr>
             <a:srgbClr val="A4A3A4"/>
           </p15:clr>
@@ -663,6 +664,1675 @@
 </p:sldLayout>
 </file>
 
+<file path=ppt/slideLayouts/slideLayout12.xml><?xml version="1.0" encoding="utf-8"?>
+<p:sldLayout xmlns:a="http://schemas.openxmlformats.org/drawingml/2006/main" xmlns:r="http://schemas.openxmlformats.org/officeDocument/2006/relationships" xmlns:p="http://schemas.openxmlformats.org/presentationml/2006/main" type="title" preserve="1">
+  <p:cSld name="标题幻灯片">
+    <p:spTree>
+      <p:nvGrpSpPr>
+        <p:cNvPr id="1" name=""/>
+        <p:cNvGrpSpPr/>
+        <p:nvPr/>
+      </p:nvGrpSpPr>
+      <p:grpSpPr>
+        <a:xfrm>
+          <a:off x="0" y="0"/>
+          <a:ext cx="0" cy="0"/>
+          <a:chOff x="0" y="0"/>
+          <a:chExt cx="0" cy="0"/>
+        </a:xfrm>
+      </p:grpSpPr>
+      <p:sp>
+        <p:nvSpPr>
+          <p:cNvPr id="2" name="标题 1"/>
+          <p:cNvSpPr>
+            <a:spLocks noGrp="1"/>
+          </p:cNvSpPr>
+          <p:nvPr>
+            <p:ph type="ctrTitle"/>
+          </p:nvPr>
+        </p:nvSpPr>
+        <p:spPr>
+          <a:xfrm>
+            <a:off x="1524000" y="1122363"/>
+            <a:ext cx="9144000" cy="2387600"/>
+          </a:xfrm>
+        </p:spPr>
+        <p:txBody>
+          <a:bodyPr anchor="b"/>
+          <a:lstStyle>
+            <a:lvl1pPr algn="ctr">
+              <a:defRPr sz="6000"/>
+            </a:lvl1pPr>
+          </a:lstStyle>
+          <a:p>
+            <a:r>
+              <a:rPr lang="zh-CN" altLang="en-US"/>
+              <a:t>单击此处编辑母版标题样式</a:t>
+            </a:r>
+            <a:endParaRPr lang="zh-CN" altLang="en-US"/>
+          </a:p>
+        </p:txBody>
+      </p:sp>
+      <p:sp>
+        <p:nvSpPr>
+          <p:cNvPr id="3" name="副标题 2"/>
+          <p:cNvSpPr>
+            <a:spLocks noGrp="1"/>
+          </p:cNvSpPr>
+          <p:nvPr>
+            <p:ph type="subTitle" idx="1"/>
+          </p:nvPr>
+        </p:nvSpPr>
+        <p:spPr>
+          <a:xfrm>
+            <a:off x="1524000" y="3602038"/>
+            <a:ext cx="9144000" cy="1655762"/>
+          </a:xfrm>
+        </p:spPr>
+        <p:txBody>
+          <a:bodyPr/>
+          <a:lstStyle>
+            <a:lvl1pPr marL="0" indent="0" algn="ctr">
+              <a:buNone/>
+              <a:defRPr sz="2400"/>
+            </a:lvl1pPr>
+            <a:lvl2pPr marL="457200" indent="0" algn="ctr">
+              <a:buNone/>
+              <a:defRPr sz="2000"/>
+            </a:lvl2pPr>
+            <a:lvl3pPr marL="914400" indent="0" algn="ctr">
+              <a:buNone/>
+              <a:defRPr sz="1800"/>
+            </a:lvl3pPr>
+            <a:lvl4pPr marL="1371600" indent="0" algn="ctr">
+              <a:buNone/>
+              <a:defRPr sz="1600"/>
+            </a:lvl4pPr>
+            <a:lvl5pPr marL="1828800" indent="0" algn="ctr">
+              <a:buNone/>
+              <a:defRPr sz="1600"/>
+            </a:lvl5pPr>
+            <a:lvl6pPr marL="2286000" indent="0" algn="ctr">
+              <a:buNone/>
+              <a:defRPr sz="1600"/>
+            </a:lvl6pPr>
+            <a:lvl7pPr marL="2743200" indent="0" algn="ctr">
+              <a:buNone/>
+              <a:defRPr sz="1600"/>
+            </a:lvl7pPr>
+            <a:lvl8pPr marL="3200400" indent="0" algn="ctr">
+              <a:buNone/>
+              <a:defRPr sz="1600"/>
+            </a:lvl8pPr>
+            <a:lvl9pPr marL="3657600" indent="0" algn="ctr">
+              <a:buNone/>
+              <a:defRPr sz="1600"/>
+            </a:lvl9pPr>
+          </a:lstStyle>
+          <a:p>
+            <a:r>
+              <a:rPr lang="zh-CN" altLang="en-US"/>
+              <a:t>单击此处编辑母版副标题样式</a:t>
+            </a:r>
+            <a:endParaRPr lang="zh-CN" altLang="en-US"/>
+          </a:p>
+        </p:txBody>
+      </p:sp>
+      <p:sp>
+        <p:nvSpPr>
+          <p:cNvPr id="4" name="日期占位符 3"/>
+          <p:cNvSpPr>
+            <a:spLocks noGrp="1"/>
+          </p:cNvSpPr>
+          <p:nvPr>
+            <p:ph type="dt" sz="half" idx="10"/>
+          </p:nvPr>
+        </p:nvSpPr>
+        <p:spPr/>
+        <p:txBody>
+          <a:bodyPr/>
+          <a:lstStyle/>
+          <a:p>
+            <a:fld id="{51FD5836-1B78-4E70-983F-F8F353C30F27}" type="datetimeFigureOut">
+              <a:rPr lang="zh-CN" altLang="en-US" smtClean="0"/>
+            </a:fld>
+            <a:endParaRPr lang="zh-CN" altLang="en-US"/>
+          </a:p>
+        </p:txBody>
+      </p:sp>
+      <p:sp>
+        <p:nvSpPr>
+          <p:cNvPr id="5" name="页脚占位符 4"/>
+          <p:cNvSpPr>
+            <a:spLocks noGrp="1"/>
+          </p:cNvSpPr>
+          <p:nvPr>
+            <p:ph type="ftr" sz="quarter" idx="11"/>
+          </p:nvPr>
+        </p:nvSpPr>
+        <p:spPr/>
+        <p:txBody>
+          <a:bodyPr/>
+          <a:lstStyle/>
+          <a:p>
+            <a:endParaRPr lang="zh-CN" altLang="en-US"/>
+          </a:p>
+        </p:txBody>
+      </p:sp>
+      <p:sp>
+        <p:nvSpPr>
+          <p:cNvPr id="6" name="灯片编号占位符 5"/>
+          <p:cNvSpPr>
+            <a:spLocks noGrp="1"/>
+          </p:cNvSpPr>
+          <p:nvPr>
+            <p:ph type="sldNum" sz="quarter" idx="12"/>
+          </p:nvPr>
+        </p:nvSpPr>
+        <p:spPr/>
+        <p:txBody>
+          <a:bodyPr/>
+          <a:lstStyle/>
+          <a:p>
+            <a:fld id="{AB80B9A9-C03D-4F64-ADE2-7C0EC2978D5F}" type="slidenum">
+              <a:rPr lang="zh-CN" altLang="en-US" smtClean="0"/>
+            </a:fld>
+            <a:endParaRPr lang="zh-CN" altLang="en-US"/>
+          </a:p>
+        </p:txBody>
+      </p:sp>
+    </p:spTree>
+  </p:cSld>
+  <p:clrMapOvr>
+    <a:masterClrMapping/>
+  </p:clrMapOvr>
+</p:sldLayout>
+</file>
+
+<file path=ppt/slideLayouts/slideLayout13.xml><?xml version="1.0" encoding="utf-8"?>
+<p:sldLayout xmlns:a="http://schemas.openxmlformats.org/drawingml/2006/main" xmlns:r="http://schemas.openxmlformats.org/officeDocument/2006/relationships" xmlns:p="http://schemas.openxmlformats.org/presentationml/2006/main" type="obj" preserve="1">
+  <p:cSld name="标题和内容">
+    <p:spTree>
+      <p:nvGrpSpPr>
+        <p:cNvPr id="1" name=""/>
+        <p:cNvGrpSpPr/>
+        <p:nvPr/>
+      </p:nvGrpSpPr>
+      <p:grpSpPr>
+        <a:xfrm>
+          <a:off x="0" y="0"/>
+          <a:ext cx="0" cy="0"/>
+          <a:chOff x="0" y="0"/>
+          <a:chExt cx="0" cy="0"/>
+        </a:xfrm>
+      </p:grpSpPr>
+      <p:sp>
+        <p:nvSpPr>
+          <p:cNvPr id="2" name="标题 1"/>
+          <p:cNvSpPr>
+            <a:spLocks noGrp="1"/>
+          </p:cNvSpPr>
+          <p:nvPr>
+            <p:ph type="title"/>
+          </p:nvPr>
+        </p:nvSpPr>
+        <p:spPr/>
+        <p:txBody>
+          <a:bodyPr/>
+          <a:lstStyle/>
+          <a:p>
+            <a:r>
+              <a:rPr lang="zh-CN" altLang="en-US"/>
+              <a:t>单击此处编辑母版标题样式</a:t>
+            </a:r>
+            <a:endParaRPr lang="zh-CN" altLang="en-US"/>
+          </a:p>
+        </p:txBody>
+      </p:sp>
+      <p:sp>
+        <p:nvSpPr>
+          <p:cNvPr id="3" name="内容占位符 2"/>
+          <p:cNvSpPr>
+            <a:spLocks noGrp="1"/>
+          </p:cNvSpPr>
+          <p:nvPr>
+            <p:ph idx="1"/>
+          </p:nvPr>
+        </p:nvSpPr>
+        <p:spPr/>
+        <p:txBody>
+          <a:bodyPr/>
+          <a:lstStyle/>
+          <a:p>
+            <a:pPr lvl="0"/>
+            <a:r>
+              <a:rPr lang="zh-CN" altLang="en-US"/>
+              <a:t>单击此处编辑母版文本样式</a:t>
+            </a:r>
+            <a:endParaRPr lang="zh-CN" altLang="en-US"/>
+          </a:p>
+          <a:p>
+            <a:pPr lvl="1"/>
+            <a:r>
+              <a:rPr lang="zh-CN" altLang="en-US"/>
+              <a:t>二级</a:t>
+            </a:r>
+            <a:endParaRPr lang="zh-CN" altLang="en-US"/>
+          </a:p>
+          <a:p>
+            <a:pPr lvl="2"/>
+            <a:r>
+              <a:rPr lang="zh-CN" altLang="en-US"/>
+              <a:t>三级</a:t>
+            </a:r>
+            <a:endParaRPr lang="zh-CN" altLang="en-US"/>
+          </a:p>
+          <a:p>
+            <a:pPr lvl="3"/>
+            <a:r>
+              <a:rPr lang="zh-CN" altLang="en-US"/>
+              <a:t>四级</a:t>
+            </a:r>
+            <a:endParaRPr lang="zh-CN" altLang="en-US"/>
+          </a:p>
+          <a:p>
+            <a:pPr lvl="4"/>
+            <a:r>
+              <a:rPr lang="zh-CN" altLang="en-US"/>
+              <a:t>五级</a:t>
+            </a:r>
+            <a:endParaRPr lang="zh-CN" altLang="en-US"/>
+          </a:p>
+        </p:txBody>
+      </p:sp>
+      <p:sp>
+        <p:nvSpPr>
+          <p:cNvPr id="4" name="日期占位符 3"/>
+          <p:cNvSpPr>
+            <a:spLocks noGrp="1"/>
+          </p:cNvSpPr>
+          <p:nvPr>
+            <p:ph type="dt" sz="half" idx="10"/>
+          </p:nvPr>
+        </p:nvSpPr>
+        <p:spPr/>
+        <p:txBody>
+          <a:bodyPr/>
+          <a:lstStyle/>
+          <a:p>
+            <a:fld id="{51FD5836-1B78-4E70-983F-F8F353C30F27}" type="datetimeFigureOut">
+              <a:rPr lang="zh-CN" altLang="en-US" smtClean="0"/>
+            </a:fld>
+            <a:endParaRPr lang="zh-CN" altLang="en-US"/>
+          </a:p>
+        </p:txBody>
+      </p:sp>
+      <p:sp>
+        <p:nvSpPr>
+          <p:cNvPr id="5" name="页脚占位符 4"/>
+          <p:cNvSpPr>
+            <a:spLocks noGrp="1"/>
+          </p:cNvSpPr>
+          <p:nvPr>
+            <p:ph type="ftr" sz="quarter" idx="11"/>
+          </p:nvPr>
+        </p:nvSpPr>
+        <p:spPr/>
+        <p:txBody>
+          <a:bodyPr/>
+          <a:lstStyle/>
+          <a:p>
+            <a:endParaRPr lang="zh-CN" altLang="en-US"/>
+          </a:p>
+        </p:txBody>
+      </p:sp>
+      <p:sp>
+        <p:nvSpPr>
+          <p:cNvPr id="6" name="灯片编号占位符 5"/>
+          <p:cNvSpPr>
+            <a:spLocks noGrp="1"/>
+          </p:cNvSpPr>
+          <p:nvPr>
+            <p:ph type="sldNum" sz="quarter" idx="12"/>
+          </p:nvPr>
+        </p:nvSpPr>
+        <p:spPr/>
+        <p:txBody>
+          <a:bodyPr/>
+          <a:lstStyle/>
+          <a:p>
+            <a:fld id="{AB80B9A9-C03D-4F64-ADE2-7C0EC2978D5F}" type="slidenum">
+              <a:rPr lang="zh-CN" altLang="en-US" smtClean="0"/>
+            </a:fld>
+            <a:endParaRPr lang="zh-CN" altLang="en-US"/>
+          </a:p>
+        </p:txBody>
+      </p:sp>
+    </p:spTree>
+  </p:cSld>
+  <p:clrMapOvr>
+    <a:masterClrMapping/>
+  </p:clrMapOvr>
+</p:sldLayout>
+</file>
+
+<file path=ppt/slideLayouts/slideLayout14.xml><?xml version="1.0" encoding="utf-8"?>
+<p:sldLayout xmlns:a="http://schemas.openxmlformats.org/drawingml/2006/main" xmlns:r="http://schemas.openxmlformats.org/officeDocument/2006/relationships" xmlns:p="http://schemas.openxmlformats.org/presentationml/2006/main" type="secHead" preserve="1">
+  <p:cSld name="节标题">
+    <p:spTree>
+      <p:nvGrpSpPr>
+        <p:cNvPr id="1" name=""/>
+        <p:cNvGrpSpPr/>
+        <p:nvPr/>
+      </p:nvGrpSpPr>
+      <p:grpSpPr>
+        <a:xfrm>
+          <a:off x="0" y="0"/>
+          <a:ext cx="0" cy="0"/>
+          <a:chOff x="0" y="0"/>
+          <a:chExt cx="0" cy="0"/>
+        </a:xfrm>
+      </p:grpSpPr>
+      <p:sp>
+        <p:nvSpPr>
+          <p:cNvPr id="2" name="标题 1"/>
+          <p:cNvSpPr>
+            <a:spLocks noGrp="1"/>
+          </p:cNvSpPr>
+          <p:nvPr>
+            <p:ph type="title"/>
+          </p:nvPr>
+        </p:nvSpPr>
+        <p:spPr>
+          <a:xfrm>
+            <a:off x="831850" y="1709738"/>
+            <a:ext cx="10515600" cy="2852737"/>
+          </a:xfrm>
+        </p:spPr>
+        <p:txBody>
+          <a:bodyPr anchor="b"/>
+          <a:lstStyle>
+            <a:lvl1pPr>
+              <a:defRPr sz="6000"/>
+            </a:lvl1pPr>
+          </a:lstStyle>
+          <a:p>
+            <a:r>
+              <a:rPr lang="zh-CN" altLang="en-US"/>
+              <a:t>单击此处编辑母版标题样式</a:t>
+            </a:r>
+            <a:endParaRPr lang="zh-CN" altLang="en-US"/>
+          </a:p>
+        </p:txBody>
+      </p:sp>
+      <p:sp>
+        <p:nvSpPr>
+          <p:cNvPr id="3" name="文本占位符 2"/>
+          <p:cNvSpPr>
+            <a:spLocks noGrp="1"/>
+          </p:cNvSpPr>
+          <p:nvPr>
+            <p:ph type="body" idx="1"/>
+          </p:nvPr>
+        </p:nvSpPr>
+        <p:spPr>
+          <a:xfrm>
+            <a:off x="831850" y="4589463"/>
+            <a:ext cx="10515600" cy="1500187"/>
+          </a:xfrm>
+        </p:spPr>
+        <p:txBody>
+          <a:bodyPr/>
+          <a:lstStyle>
+            <a:lvl1pPr marL="0" indent="0">
+              <a:buNone/>
+              <a:defRPr sz="2400">
+                <a:solidFill>
+                  <a:schemeClr val="tx1">
+                    <a:tint val="75000"/>
+                  </a:schemeClr>
+                </a:solidFill>
+              </a:defRPr>
+            </a:lvl1pPr>
+            <a:lvl2pPr marL="457200" indent="0">
+              <a:buNone/>
+              <a:defRPr sz="2000">
+                <a:solidFill>
+                  <a:schemeClr val="tx1">
+                    <a:tint val="75000"/>
+                  </a:schemeClr>
+                </a:solidFill>
+              </a:defRPr>
+            </a:lvl2pPr>
+            <a:lvl3pPr marL="914400" indent="0">
+              <a:buNone/>
+              <a:defRPr sz="1800">
+                <a:solidFill>
+                  <a:schemeClr val="tx1">
+                    <a:tint val="75000"/>
+                  </a:schemeClr>
+                </a:solidFill>
+              </a:defRPr>
+            </a:lvl3pPr>
+            <a:lvl4pPr marL="1371600" indent="0">
+              <a:buNone/>
+              <a:defRPr sz="1600">
+                <a:solidFill>
+                  <a:schemeClr val="tx1">
+                    <a:tint val="75000"/>
+                  </a:schemeClr>
+                </a:solidFill>
+              </a:defRPr>
+            </a:lvl4pPr>
+            <a:lvl5pPr marL="1828800" indent="0">
+              <a:buNone/>
+              <a:defRPr sz="1600">
+                <a:solidFill>
+                  <a:schemeClr val="tx1">
+                    <a:tint val="75000"/>
+                  </a:schemeClr>
+                </a:solidFill>
+              </a:defRPr>
+            </a:lvl5pPr>
+            <a:lvl6pPr marL="2286000" indent="0">
+              <a:buNone/>
+              <a:defRPr sz="1600">
+                <a:solidFill>
+                  <a:schemeClr val="tx1">
+                    <a:tint val="75000"/>
+                  </a:schemeClr>
+                </a:solidFill>
+              </a:defRPr>
+            </a:lvl6pPr>
+            <a:lvl7pPr marL="2743200" indent="0">
+              <a:buNone/>
+              <a:defRPr sz="1600">
+                <a:solidFill>
+                  <a:schemeClr val="tx1">
+                    <a:tint val="75000"/>
+                  </a:schemeClr>
+                </a:solidFill>
+              </a:defRPr>
+            </a:lvl7pPr>
+            <a:lvl8pPr marL="3200400" indent="0">
+              <a:buNone/>
+              <a:defRPr sz="1600">
+                <a:solidFill>
+                  <a:schemeClr val="tx1">
+                    <a:tint val="75000"/>
+                  </a:schemeClr>
+                </a:solidFill>
+              </a:defRPr>
+            </a:lvl8pPr>
+            <a:lvl9pPr marL="3657600" indent="0">
+              <a:buNone/>
+              <a:defRPr sz="1600">
+                <a:solidFill>
+                  <a:schemeClr val="tx1">
+                    <a:tint val="75000"/>
+                  </a:schemeClr>
+                </a:solidFill>
+              </a:defRPr>
+            </a:lvl9pPr>
+          </a:lstStyle>
+          <a:p>
+            <a:pPr lvl="0"/>
+            <a:r>
+              <a:rPr lang="zh-CN" altLang="en-US"/>
+              <a:t>单击此处编辑母版文本样式</a:t>
+            </a:r>
+            <a:endParaRPr lang="zh-CN" altLang="en-US"/>
+          </a:p>
+        </p:txBody>
+      </p:sp>
+      <p:sp>
+        <p:nvSpPr>
+          <p:cNvPr id="4" name="日期占位符 3"/>
+          <p:cNvSpPr>
+            <a:spLocks noGrp="1"/>
+          </p:cNvSpPr>
+          <p:nvPr>
+            <p:ph type="dt" sz="half" idx="10"/>
+          </p:nvPr>
+        </p:nvSpPr>
+        <p:spPr/>
+        <p:txBody>
+          <a:bodyPr/>
+          <a:lstStyle/>
+          <a:p>
+            <a:fld id="{51FD5836-1B78-4E70-983F-F8F353C30F27}" type="datetimeFigureOut">
+              <a:rPr lang="zh-CN" altLang="en-US" smtClean="0"/>
+            </a:fld>
+            <a:endParaRPr lang="zh-CN" altLang="en-US"/>
+          </a:p>
+        </p:txBody>
+      </p:sp>
+      <p:sp>
+        <p:nvSpPr>
+          <p:cNvPr id="5" name="页脚占位符 4"/>
+          <p:cNvSpPr>
+            <a:spLocks noGrp="1"/>
+          </p:cNvSpPr>
+          <p:nvPr>
+            <p:ph type="ftr" sz="quarter" idx="11"/>
+          </p:nvPr>
+        </p:nvSpPr>
+        <p:spPr/>
+        <p:txBody>
+          <a:bodyPr/>
+          <a:lstStyle/>
+          <a:p>
+            <a:endParaRPr lang="zh-CN" altLang="en-US"/>
+          </a:p>
+        </p:txBody>
+      </p:sp>
+      <p:sp>
+        <p:nvSpPr>
+          <p:cNvPr id="6" name="灯片编号占位符 5"/>
+          <p:cNvSpPr>
+            <a:spLocks noGrp="1"/>
+          </p:cNvSpPr>
+          <p:nvPr>
+            <p:ph type="sldNum" sz="quarter" idx="12"/>
+          </p:nvPr>
+        </p:nvSpPr>
+        <p:spPr/>
+        <p:txBody>
+          <a:bodyPr/>
+          <a:lstStyle/>
+          <a:p>
+            <a:fld id="{AB80B9A9-C03D-4F64-ADE2-7C0EC2978D5F}" type="slidenum">
+              <a:rPr lang="zh-CN" altLang="en-US" smtClean="0"/>
+            </a:fld>
+            <a:endParaRPr lang="zh-CN" altLang="en-US"/>
+          </a:p>
+        </p:txBody>
+      </p:sp>
+    </p:spTree>
+  </p:cSld>
+  <p:clrMapOvr>
+    <a:masterClrMapping/>
+  </p:clrMapOvr>
+</p:sldLayout>
+</file>
+
+<file path=ppt/slideLayouts/slideLayout15.xml><?xml version="1.0" encoding="utf-8"?>
+<p:sldLayout xmlns:a="http://schemas.openxmlformats.org/drawingml/2006/main" xmlns:r="http://schemas.openxmlformats.org/officeDocument/2006/relationships" xmlns:p="http://schemas.openxmlformats.org/presentationml/2006/main" type="twoObj" preserve="1">
+  <p:cSld name="两栏内容">
+    <p:spTree>
+      <p:nvGrpSpPr>
+        <p:cNvPr id="1" name=""/>
+        <p:cNvGrpSpPr/>
+        <p:nvPr/>
+      </p:nvGrpSpPr>
+      <p:grpSpPr>
+        <a:xfrm>
+          <a:off x="0" y="0"/>
+          <a:ext cx="0" cy="0"/>
+          <a:chOff x="0" y="0"/>
+          <a:chExt cx="0" cy="0"/>
+        </a:xfrm>
+      </p:grpSpPr>
+      <p:sp>
+        <p:nvSpPr>
+          <p:cNvPr id="2" name="标题 1"/>
+          <p:cNvSpPr>
+            <a:spLocks noGrp="1"/>
+          </p:cNvSpPr>
+          <p:nvPr>
+            <p:ph type="title"/>
+          </p:nvPr>
+        </p:nvSpPr>
+        <p:spPr/>
+        <p:txBody>
+          <a:bodyPr/>
+          <a:lstStyle/>
+          <a:p>
+            <a:r>
+              <a:rPr lang="zh-CN" altLang="en-US"/>
+              <a:t>单击此处编辑母版标题样式</a:t>
+            </a:r>
+            <a:endParaRPr lang="zh-CN" altLang="en-US"/>
+          </a:p>
+        </p:txBody>
+      </p:sp>
+      <p:sp>
+        <p:nvSpPr>
+          <p:cNvPr id="3" name="内容占位符 2"/>
+          <p:cNvSpPr>
+            <a:spLocks noGrp="1"/>
+          </p:cNvSpPr>
+          <p:nvPr>
+            <p:ph sz="half" idx="1"/>
+          </p:nvPr>
+        </p:nvSpPr>
+        <p:spPr>
+          <a:xfrm>
+            <a:off x="838200" y="1825625"/>
+            <a:ext cx="5181600" cy="4351338"/>
+          </a:xfrm>
+        </p:spPr>
+        <p:txBody>
+          <a:bodyPr/>
+          <a:lstStyle/>
+          <a:p>
+            <a:pPr lvl="0"/>
+            <a:r>
+              <a:rPr lang="zh-CN" altLang="en-US"/>
+              <a:t>单击此处编辑母版文本样式</a:t>
+            </a:r>
+            <a:endParaRPr lang="zh-CN" altLang="en-US"/>
+          </a:p>
+          <a:p>
+            <a:pPr lvl="1"/>
+            <a:r>
+              <a:rPr lang="zh-CN" altLang="en-US"/>
+              <a:t>二级</a:t>
+            </a:r>
+            <a:endParaRPr lang="zh-CN" altLang="en-US"/>
+          </a:p>
+          <a:p>
+            <a:pPr lvl="2"/>
+            <a:r>
+              <a:rPr lang="zh-CN" altLang="en-US"/>
+              <a:t>三级</a:t>
+            </a:r>
+            <a:endParaRPr lang="zh-CN" altLang="en-US"/>
+          </a:p>
+          <a:p>
+            <a:pPr lvl="3"/>
+            <a:r>
+              <a:rPr lang="zh-CN" altLang="en-US"/>
+              <a:t>四级</a:t>
+            </a:r>
+            <a:endParaRPr lang="zh-CN" altLang="en-US"/>
+          </a:p>
+          <a:p>
+            <a:pPr lvl="4"/>
+            <a:r>
+              <a:rPr lang="zh-CN" altLang="en-US"/>
+              <a:t>五级</a:t>
+            </a:r>
+            <a:endParaRPr lang="zh-CN" altLang="en-US"/>
+          </a:p>
+        </p:txBody>
+      </p:sp>
+      <p:sp>
+        <p:nvSpPr>
+          <p:cNvPr id="4" name="内容占位符 3"/>
+          <p:cNvSpPr>
+            <a:spLocks noGrp="1"/>
+          </p:cNvSpPr>
+          <p:nvPr>
+            <p:ph sz="half" idx="2"/>
+          </p:nvPr>
+        </p:nvSpPr>
+        <p:spPr>
+          <a:xfrm>
+            <a:off x="6172200" y="1825625"/>
+            <a:ext cx="5181600" cy="4351338"/>
+          </a:xfrm>
+        </p:spPr>
+        <p:txBody>
+          <a:bodyPr/>
+          <a:lstStyle/>
+          <a:p>
+            <a:pPr lvl="0"/>
+            <a:r>
+              <a:rPr lang="zh-CN" altLang="en-US"/>
+              <a:t>单击此处编辑母版文本样式</a:t>
+            </a:r>
+            <a:endParaRPr lang="zh-CN" altLang="en-US"/>
+          </a:p>
+          <a:p>
+            <a:pPr lvl="1"/>
+            <a:r>
+              <a:rPr lang="zh-CN" altLang="en-US"/>
+              <a:t>二级</a:t>
+            </a:r>
+            <a:endParaRPr lang="zh-CN" altLang="en-US"/>
+          </a:p>
+          <a:p>
+            <a:pPr lvl="2"/>
+            <a:r>
+              <a:rPr lang="zh-CN" altLang="en-US"/>
+              <a:t>三级</a:t>
+            </a:r>
+            <a:endParaRPr lang="zh-CN" altLang="en-US"/>
+          </a:p>
+          <a:p>
+            <a:pPr lvl="3"/>
+            <a:r>
+              <a:rPr lang="zh-CN" altLang="en-US"/>
+              <a:t>四级</a:t>
+            </a:r>
+            <a:endParaRPr lang="zh-CN" altLang="en-US"/>
+          </a:p>
+          <a:p>
+            <a:pPr lvl="4"/>
+            <a:r>
+              <a:rPr lang="zh-CN" altLang="en-US"/>
+              <a:t>五级</a:t>
+            </a:r>
+            <a:endParaRPr lang="zh-CN" altLang="en-US"/>
+          </a:p>
+        </p:txBody>
+      </p:sp>
+      <p:sp>
+        <p:nvSpPr>
+          <p:cNvPr id="5" name="日期占位符 4"/>
+          <p:cNvSpPr>
+            <a:spLocks noGrp="1"/>
+          </p:cNvSpPr>
+          <p:nvPr>
+            <p:ph type="dt" sz="half" idx="10"/>
+          </p:nvPr>
+        </p:nvSpPr>
+        <p:spPr/>
+        <p:txBody>
+          <a:bodyPr/>
+          <a:lstStyle/>
+          <a:p>
+            <a:fld id="{51FD5836-1B78-4E70-983F-F8F353C30F27}" type="datetimeFigureOut">
+              <a:rPr lang="zh-CN" altLang="en-US" smtClean="0"/>
+            </a:fld>
+            <a:endParaRPr lang="zh-CN" altLang="en-US"/>
+          </a:p>
+        </p:txBody>
+      </p:sp>
+      <p:sp>
+        <p:nvSpPr>
+          <p:cNvPr id="6" name="页脚占位符 5"/>
+          <p:cNvSpPr>
+            <a:spLocks noGrp="1"/>
+          </p:cNvSpPr>
+          <p:nvPr>
+            <p:ph type="ftr" sz="quarter" idx="11"/>
+          </p:nvPr>
+        </p:nvSpPr>
+        <p:spPr/>
+        <p:txBody>
+          <a:bodyPr/>
+          <a:lstStyle/>
+          <a:p>
+            <a:endParaRPr lang="zh-CN" altLang="en-US"/>
+          </a:p>
+        </p:txBody>
+      </p:sp>
+      <p:sp>
+        <p:nvSpPr>
+          <p:cNvPr id="7" name="灯片编号占位符 6"/>
+          <p:cNvSpPr>
+            <a:spLocks noGrp="1"/>
+          </p:cNvSpPr>
+          <p:nvPr>
+            <p:ph type="sldNum" sz="quarter" idx="12"/>
+          </p:nvPr>
+        </p:nvSpPr>
+        <p:spPr/>
+        <p:txBody>
+          <a:bodyPr/>
+          <a:lstStyle/>
+          <a:p>
+            <a:fld id="{AB80B9A9-C03D-4F64-ADE2-7C0EC2978D5F}" type="slidenum">
+              <a:rPr lang="zh-CN" altLang="en-US" smtClean="0"/>
+            </a:fld>
+            <a:endParaRPr lang="zh-CN" altLang="en-US"/>
+          </a:p>
+        </p:txBody>
+      </p:sp>
+    </p:spTree>
+  </p:cSld>
+  <p:clrMapOvr>
+    <a:masterClrMapping/>
+  </p:clrMapOvr>
+</p:sldLayout>
+</file>
+
+<file path=ppt/slideLayouts/slideLayout16.xml><?xml version="1.0" encoding="utf-8"?>
+<p:sldLayout xmlns:a="http://schemas.openxmlformats.org/drawingml/2006/main" xmlns:r="http://schemas.openxmlformats.org/officeDocument/2006/relationships" xmlns:p="http://schemas.openxmlformats.org/presentationml/2006/main" type="twoTxTwoObj" preserve="1">
+  <p:cSld name="比较">
+    <p:spTree>
+      <p:nvGrpSpPr>
+        <p:cNvPr id="1" name=""/>
+        <p:cNvGrpSpPr/>
+        <p:nvPr/>
+      </p:nvGrpSpPr>
+      <p:grpSpPr>
+        <a:xfrm>
+          <a:off x="0" y="0"/>
+          <a:ext cx="0" cy="0"/>
+          <a:chOff x="0" y="0"/>
+          <a:chExt cx="0" cy="0"/>
+        </a:xfrm>
+      </p:grpSpPr>
+      <p:sp>
+        <p:nvSpPr>
+          <p:cNvPr id="2" name="标题 1"/>
+          <p:cNvSpPr>
+            <a:spLocks noGrp="1"/>
+          </p:cNvSpPr>
+          <p:nvPr>
+            <p:ph type="title"/>
+          </p:nvPr>
+        </p:nvSpPr>
+        <p:spPr>
+          <a:xfrm>
+            <a:off x="839788" y="365125"/>
+            <a:ext cx="10515600" cy="1325563"/>
+          </a:xfrm>
+        </p:spPr>
+        <p:txBody>
+          <a:bodyPr/>
+          <a:lstStyle/>
+          <a:p>
+            <a:r>
+              <a:rPr lang="zh-CN" altLang="en-US"/>
+              <a:t>单击此处编辑母版标题样式</a:t>
+            </a:r>
+            <a:endParaRPr lang="zh-CN" altLang="en-US"/>
+          </a:p>
+        </p:txBody>
+      </p:sp>
+      <p:sp>
+        <p:nvSpPr>
+          <p:cNvPr id="3" name="文本占位符 2"/>
+          <p:cNvSpPr>
+            <a:spLocks noGrp="1"/>
+          </p:cNvSpPr>
+          <p:nvPr>
+            <p:ph type="body" idx="1"/>
+          </p:nvPr>
+        </p:nvSpPr>
+        <p:spPr>
+          <a:xfrm>
+            <a:off x="839788" y="1681163"/>
+            <a:ext cx="5157787" cy="823912"/>
+          </a:xfrm>
+        </p:spPr>
+        <p:txBody>
+          <a:bodyPr anchor="b"/>
+          <a:lstStyle>
+            <a:lvl1pPr marL="0" indent="0">
+              <a:buNone/>
+              <a:defRPr sz="2400" b="1"/>
+            </a:lvl1pPr>
+            <a:lvl2pPr marL="457200" indent="0">
+              <a:buNone/>
+              <a:defRPr sz="2000" b="1"/>
+            </a:lvl2pPr>
+            <a:lvl3pPr marL="914400" indent="0">
+              <a:buNone/>
+              <a:defRPr sz="1800" b="1"/>
+            </a:lvl3pPr>
+            <a:lvl4pPr marL="1371600" indent="0">
+              <a:buNone/>
+              <a:defRPr sz="1600" b="1"/>
+            </a:lvl4pPr>
+            <a:lvl5pPr marL="1828800" indent="0">
+              <a:buNone/>
+              <a:defRPr sz="1600" b="1"/>
+            </a:lvl5pPr>
+            <a:lvl6pPr marL="2286000" indent="0">
+              <a:buNone/>
+              <a:defRPr sz="1600" b="1"/>
+            </a:lvl6pPr>
+            <a:lvl7pPr marL="2743200" indent="0">
+              <a:buNone/>
+              <a:defRPr sz="1600" b="1"/>
+            </a:lvl7pPr>
+            <a:lvl8pPr marL="3200400" indent="0">
+              <a:buNone/>
+              <a:defRPr sz="1600" b="1"/>
+            </a:lvl8pPr>
+            <a:lvl9pPr marL="3657600" indent="0">
+              <a:buNone/>
+              <a:defRPr sz="1600" b="1"/>
+            </a:lvl9pPr>
+          </a:lstStyle>
+          <a:p>
+            <a:pPr lvl="0"/>
+            <a:r>
+              <a:rPr lang="zh-CN" altLang="en-US"/>
+              <a:t>单击此处编辑母版文本样式</a:t>
+            </a:r>
+            <a:endParaRPr lang="zh-CN" altLang="en-US"/>
+          </a:p>
+        </p:txBody>
+      </p:sp>
+      <p:sp>
+        <p:nvSpPr>
+          <p:cNvPr id="4" name="内容占位符 3"/>
+          <p:cNvSpPr>
+            <a:spLocks noGrp="1"/>
+          </p:cNvSpPr>
+          <p:nvPr>
+            <p:ph sz="half" idx="2"/>
+          </p:nvPr>
+        </p:nvSpPr>
+        <p:spPr>
+          <a:xfrm>
+            <a:off x="839788" y="2505075"/>
+            <a:ext cx="5157787" cy="3684588"/>
+          </a:xfrm>
+        </p:spPr>
+        <p:txBody>
+          <a:bodyPr/>
+          <a:lstStyle/>
+          <a:p>
+            <a:pPr lvl="0"/>
+            <a:r>
+              <a:rPr lang="zh-CN" altLang="en-US"/>
+              <a:t>单击此处编辑母版文本样式</a:t>
+            </a:r>
+            <a:endParaRPr lang="zh-CN" altLang="en-US"/>
+          </a:p>
+          <a:p>
+            <a:pPr lvl="1"/>
+            <a:r>
+              <a:rPr lang="zh-CN" altLang="en-US"/>
+              <a:t>二级</a:t>
+            </a:r>
+            <a:endParaRPr lang="zh-CN" altLang="en-US"/>
+          </a:p>
+          <a:p>
+            <a:pPr lvl="2"/>
+            <a:r>
+              <a:rPr lang="zh-CN" altLang="en-US"/>
+              <a:t>三级</a:t>
+            </a:r>
+            <a:endParaRPr lang="zh-CN" altLang="en-US"/>
+          </a:p>
+          <a:p>
+            <a:pPr lvl="3"/>
+            <a:r>
+              <a:rPr lang="zh-CN" altLang="en-US"/>
+              <a:t>四级</a:t>
+            </a:r>
+            <a:endParaRPr lang="zh-CN" altLang="en-US"/>
+          </a:p>
+          <a:p>
+            <a:pPr lvl="4"/>
+            <a:r>
+              <a:rPr lang="zh-CN" altLang="en-US"/>
+              <a:t>五级</a:t>
+            </a:r>
+            <a:endParaRPr lang="zh-CN" altLang="en-US"/>
+          </a:p>
+        </p:txBody>
+      </p:sp>
+      <p:sp>
+        <p:nvSpPr>
+          <p:cNvPr id="5" name="文本占位符 4"/>
+          <p:cNvSpPr>
+            <a:spLocks noGrp="1"/>
+          </p:cNvSpPr>
+          <p:nvPr>
+            <p:ph type="body" sz="quarter" idx="3"/>
+          </p:nvPr>
+        </p:nvSpPr>
+        <p:spPr>
+          <a:xfrm>
+            <a:off x="6172200" y="1681163"/>
+            <a:ext cx="5183188" cy="823912"/>
+          </a:xfrm>
+        </p:spPr>
+        <p:txBody>
+          <a:bodyPr anchor="b"/>
+          <a:lstStyle>
+            <a:lvl1pPr marL="0" indent="0">
+              <a:buNone/>
+              <a:defRPr sz="2400" b="1"/>
+            </a:lvl1pPr>
+            <a:lvl2pPr marL="457200" indent="0">
+              <a:buNone/>
+              <a:defRPr sz="2000" b="1"/>
+            </a:lvl2pPr>
+            <a:lvl3pPr marL="914400" indent="0">
+              <a:buNone/>
+              <a:defRPr sz="1800" b="1"/>
+            </a:lvl3pPr>
+            <a:lvl4pPr marL="1371600" indent="0">
+              <a:buNone/>
+              <a:defRPr sz="1600" b="1"/>
+            </a:lvl4pPr>
+            <a:lvl5pPr marL="1828800" indent="0">
+              <a:buNone/>
+              <a:defRPr sz="1600" b="1"/>
+            </a:lvl5pPr>
+            <a:lvl6pPr marL="2286000" indent="0">
+              <a:buNone/>
+              <a:defRPr sz="1600" b="1"/>
+            </a:lvl6pPr>
+            <a:lvl7pPr marL="2743200" indent="0">
+              <a:buNone/>
+              <a:defRPr sz="1600" b="1"/>
+            </a:lvl7pPr>
+            <a:lvl8pPr marL="3200400" indent="0">
+              <a:buNone/>
+              <a:defRPr sz="1600" b="1"/>
+            </a:lvl8pPr>
+            <a:lvl9pPr marL="3657600" indent="0">
+              <a:buNone/>
+              <a:defRPr sz="1600" b="1"/>
+            </a:lvl9pPr>
+          </a:lstStyle>
+          <a:p>
+            <a:pPr lvl="0"/>
+            <a:r>
+              <a:rPr lang="zh-CN" altLang="en-US"/>
+              <a:t>单击此处编辑母版文本样式</a:t>
+            </a:r>
+            <a:endParaRPr lang="zh-CN" altLang="en-US"/>
+          </a:p>
+        </p:txBody>
+      </p:sp>
+      <p:sp>
+        <p:nvSpPr>
+          <p:cNvPr id="6" name="内容占位符 5"/>
+          <p:cNvSpPr>
+            <a:spLocks noGrp="1"/>
+          </p:cNvSpPr>
+          <p:nvPr>
+            <p:ph sz="quarter" idx="4"/>
+          </p:nvPr>
+        </p:nvSpPr>
+        <p:spPr>
+          <a:xfrm>
+            <a:off x="6172200" y="2505075"/>
+            <a:ext cx="5183188" cy="3684588"/>
+          </a:xfrm>
+        </p:spPr>
+        <p:txBody>
+          <a:bodyPr/>
+          <a:lstStyle/>
+          <a:p>
+            <a:pPr lvl="0"/>
+            <a:r>
+              <a:rPr lang="zh-CN" altLang="en-US"/>
+              <a:t>单击此处编辑母版文本样式</a:t>
+            </a:r>
+            <a:endParaRPr lang="zh-CN" altLang="en-US"/>
+          </a:p>
+          <a:p>
+            <a:pPr lvl="1"/>
+            <a:r>
+              <a:rPr lang="zh-CN" altLang="en-US"/>
+              <a:t>二级</a:t>
+            </a:r>
+            <a:endParaRPr lang="zh-CN" altLang="en-US"/>
+          </a:p>
+          <a:p>
+            <a:pPr lvl="2"/>
+            <a:r>
+              <a:rPr lang="zh-CN" altLang="en-US"/>
+              <a:t>三级</a:t>
+            </a:r>
+            <a:endParaRPr lang="zh-CN" altLang="en-US"/>
+          </a:p>
+          <a:p>
+            <a:pPr lvl="3"/>
+            <a:r>
+              <a:rPr lang="zh-CN" altLang="en-US"/>
+              <a:t>四级</a:t>
+            </a:r>
+            <a:endParaRPr lang="zh-CN" altLang="en-US"/>
+          </a:p>
+          <a:p>
+            <a:pPr lvl="4"/>
+            <a:r>
+              <a:rPr lang="zh-CN" altLang="en-US"/>
+              <a:t>五级</a:t>
+            </a:r>
+            <a:endParaRPr lang="zh-CN" altLang="en-US"/>
+          </a:p>
+        </p:txBody>
+      </p:sp>
+      <p:sp>
+        <p:nvSpPr>
+          <p:cNvPr id="7" name="日期占位符 6"/>
+          <p:cNvSpPr>
+            <a:spLocks noGrp="1"/>
+          </p:cNvSpPr>
+          <p:nvPr>
+            <p:ph type="dt" sz="half" idx="10"/>
+          </p:nvPr>
+        </p:nvSpPr>
+        <p:spPr/>
+        <p:txBody>
+          <a:bodyPr/>
+          <a:lstStyle/>
+          <a:p>
+            <a:fld id="{51FD5836-1B78-4E70-983F-F8F353C30F27}" type="datetimeFigureOut">
+              <a:rPr lang="zh-CN" altLang="en-US" smtClean="0"/>
+            </a:fld>
+            <a:endParaRPr lang="zh-CN" altLang="en-US"/>
+          </a:p>
+        </p:txBody>
+      </p:sp>
+      <p:sp>
+        <p:nvSpPr>
+          <p:cNvPr id="8" name="页脚占位符 7"/>
+          <p:cNvSpPr>
+            <a:spLocks noGrp="1"/>
+          </p:cNvSpPr>
+          <p:nvPr>
+            <p:ph type="ftr" sz="quarter" idx="11"/>
+          </p:nvPr>
+        </p:nvSpPr>
+        <p:spPr/>
+        <p:txBody>
+          <a:bodyPr/>
+          <a:lstStyle/>
+          <a:p>
+            <a:endParaRPr lang="zh-CN" altLang="en-US"/>
+          </a:p>
+        </p:txBody>
+      </p:sp>
+      <p:sp>
+        <p:nvSpPr>
+          <p:cNvPr id="9" name="灯片编号占位符 8"/>
+          <p:cNvSpPr>
+            <a:spLocks noGrp="1"/>
+          </p:cNvSpPr>
+          <p:nvPr>
+            <p:ph type="sldNum" sz="quarter" idx="12"/>
+          </p:nvPr>
+        </p:nvSpPr>
+        <p:spPr/>
+        <p:txBody>
+          <a:bodyPr/>
+          <a:lstStyle/>
+          <a:p>
+            <a:fld id="{AB80B9A9-C03D-4F64-ADE2-7C0EC2978D5F}" type="slidenum">
+              <a:rPr lang="zh-CN" altLang="en-US" smtClean="0"/>
+            </a:fld>
+            <a:endParaRPr lang="zh-CN" altLang="en-US"/>
+          </a:p>
+        </p:txBody>
+      </p:sp>
+    </p:spTree>
+  </p:cSld>
+  <p:clrMapOvr>
+    <a:masterClrMapping/>
+  </p:clrMapOvr>
+</p:sldLayout>
+</file>
+
+<file path=ppt/slideLayouts/slideLayout17.xml><?xml version="1.0" encoding="utf-8"?>
+<p:sldLayout xmlns:a="http://schemas.openxmlformats.org/drawingml/2006/main" xmlns:r="http://schemas.openxmlformats.org/officeDocument/2006/relationships" xmlns:p="http://schemas.openxmlformats.org/presentationml/2006/main" type="titleOnly" preserve="1">
+  <p:cSld name="仅标题">
+    <p:spTree>
+      <p:nvGrpSpPr>
+        <p:cNvPr id="1" name=""/>
+        <p:cNvGrpSpPr/>
+        <p:nvPr/>
+      </p:nvGrpSpPr>
+      <p:grpSpPr>
+        <a:xfrm>
+          <a:off x="0" y="0"/>
+          <a:ext cx="0" cy="0"/>
+          <a:chOff x="0" y="0"/>
+          <a:chExt cx="0" cy="0"/>
+        </a:xfrm>
+      </p:grpSpPr>
+      <p:sp>
+        <p:nvSpPr>
+          <p:cNvPr id="2" name="标题 1"/>
+          <p:cNvSpPr>
+            <a:spLocks noGrp="1"/>
+          </p:cNvSpPr>
+          <p:nvPr>
+            <p:ph type="title"/>
+          </p:nvPr>
+        </p:nvSpPr>
+        <p:spPr/>
+        <p:txBody>
+          <a:bodyPr/>
+          <a:lstStyle/>
+          <a:p>
+            <a:r>
+              <a:rPr lang="zh-CN" altLang="en-US"/>
+              <a:t>单击此处编辑母版标题样式</a:t>
+            </a:r>
+            <a:endParaRPr lang="zh-CN" altLang="en-US"/>
+          </a:p>
+        </p:txBody>
+      </p:sp>
+      <p:sp>
+        <p:nvSpPr>
+          <p:cNvPr id="3" name="日期占位符 2"/>
+          <p:cNvSpPr>
+            <a:spLocks noGrp="1"/>
+          </p:cNvSpPr>
+          <p:nvPr>
+            <p:ph type="dt" sz="half" idx="10"/>
+          </p:nvPr>
+        </p:nvSpPr>
+        <p:spPr/>
+        <p:txBody>
+          <a:bodyPr/>
+          <a:lstStyle/>
+          <a:p>
+            <a:fld id="{51FD5836-1B78-4E70-983F-F8F353C30F27}" type="datetimeFigureOut">
+              <a:rPr lang="zh-CN" altLang="en-US" smtClean="0"/>
+            </a:fld>
+            <a:endParaRPr lang="zh-CN" altLang="en-US"/>
+          </a:p>
+        </p:txBody>
+      </p:sp>
+      <p:sp>
+        <p:nvSpPr>
+          <p:cNvPr id="4" name="页脚占位符 3"/>
+          <p:cNvSpPr>
+            <a:spLocks noGrp="1"/>
+          </p:cNvSpPr>
+          <p:nvPr>
+            <p:ph type="ftr" sz="quarter" idx="11"/>
+          </p:nvPr>
+        </p:nvSpPr>
+        <p:spPr/>
+        <p:txBody>
+          <a:bodyPr/>
+          <a:lstStyle/>
+          <a:p>
+            <a:endParaRPr lang="zh-CN" altLang="en-US"/>
+          </a:p>
+        </p:txBody>
+      </p:sp>
+      <p:sp>
+        <p:nvSpPr>
+          <p:cNvPr id="5" name="灯片编号占位符 4"/>
+          <p:cNvSpPr>
+            <a:spLocks noGrp="1"/>
+          </p:cNvSpPr>
+          <p:nvPr>
+            <p:ph type="sldNum" sz="quarter" idx="12"/>
+          </p:nvPr>
+        </p:nvSpPr>
+        <p:spPr/>
+        <p:txBody>
+          <a:bodyPr/>
+          <a:lstStyle/>
+          <a:p>
+            <a:fld id="{AB80B9A9-C03D-4F64-ADE2-7C0EC2978D5F}" type="slidenum">
+              <a:rPr lang="zh-CN" altLang="en-US" smtClean="0"/>
+            </a:fld>
+            <a:endParaRPr lang="zh-CN" altLang="en-US"/>
+          </a:p>
+        </p:txBody>
+      </p:sp>
+    </p:spTree>
+  </p:cSld>
+  <p:clrMapOvr>
+    <a:masterClrMapping/>
+  </p:clrMapOvr>
+</p:sldLayout>
+</file>
+
+<file path=ppt/slideLayouts/slideLayout18.xml><?xml version="1.0" encoding="utf-8"?>
+<p:sldLayout xmlns:a="http://schemas.openxmlformats.org/drawingml/2006/main" xmlns:r="http://schemas.openxmlformats.org/officeDocument/2006/relationships" xmlns:p="http://schemas.openxmlformats.org/presentationml/2006/main" type="blank" preserve="1">
+  <p:cSld name="空白">
+    <p:spTree>
+      <p:nvGrpSpPr>
+        <p:cNvPr id="1" name=""/>
+        <p:cNvGrpSpPr/>
+        <p:nvPr/>
+      </p:nvGrpSpPr>
+      <p:grpSpPr>
+        <a:xfrm>
+          <a:off x="0" y="0"/>
+          <a:ext cx="0" cy="0"/>
+          <a:chOff x="0" y="0"/>
+          <a:chExt cx="0" cy="0"/>
+        </a:xfrm>
+      </p:grpSpPr>
+      <p:sp>
+        <p:nvSpPr>
+          <p:cNvPr id="2" name="日期占位符 1"/>
+          <p:cNvSpPr>
+            <a:spLocks noGrp="1"/>
+          </p:cNvSpPr>
+          <p:nvPr>
+            <p:ph type="dt" sz="half" idx="10"/>
+          </p:nvPr>
+        </p:nvSpPr>
+        <p:spPr/>
+        <p:txBody>
+          <a:bodyPr/>
+          <a:lstStyle/>
+          <a:p>
+            <a:fld id="{51FD5836-1B78-4E70-983F-F8F353C30F27}" type="datetimeFigureOut">
+              <a:rPr lang="zh-CN" altLang="en-US" smtClean="0"/>
+            </a:fld>
+            <a:endParaRPr lang="zh-CN" altLang="en-US"/>
+          </a:p>
+        </p:txBody>
+      </p:sp>
+      <p:sp>
+        <p:nvSpPr>
+          <p:cNvPr id="3" name="页脚占位符 2"/>
+          <p:cNvSpPr>
+            <a:spLocks noGrp="1"/>
+          </p:cNvSpPr>
+          <p:nvPr>
+            <p:ph type="ftr" sz="quarter" idx="11"/>
+          </p:nvPr>
+        </p:nvSpPr>
+        <p:spPr/>
+        <p:txBody>
+          <a:bodyPr/>
+          <a:lstStyle/>
+          <a:p>
+            <a:endParaRPr lang="zh-CN" altLang="en-US"/>
+          </a:p>
+        </p:txBody>
+      </p:sp>
+      <p:sp>
+        <p:nvSpPr>
+          <p:cNvPr id="4" name="灯片编号占位符 3"/>
+          <p:cNvSpPr>
+            <a:spLocks noGrp="1"/>
+          </p:cNvSpPr>
+          <p:nvPr>
+            <p:ph type="sldNum" sz="quarter" idx="12"/>
+          </p:nvPr>
+        </p:nvSpPr>
+        <p:spPr/>
+        <p:txBody>
+          <a:bodyPr/>
+          <a:lstStyle/>
+          <a:p>
+            <a:fld id="{AB80B9A9-C03D-4F64-ADE2-7C0EC2978D5F}" type="slidenum">
+              <a:rPr lang="zh-CN" altLang="en-US" smtClean="0"/>
+            </a:fld>
+            <a:endParaRPr lang="zh-CN" altLang="en-US"/>
+          </a:p>
+        </p:txBody>
+      </p:sp>
+    </p:spTree>
+  </p:cSld>
+  <p:clrMapOvr>
+    <a:masterClrMapping/>
+  </p:clrMapOvr>
+</p:sldLayout>
+</file>
+
+<file path=ppt/slideLayouts/slideLayout19.xml><?xml version="1.0" encoding="utf-8"?>
+<p:sldLayout xmlns:a="http://schemas.openxmlformats.org/drawingml/2006/main" xmlns:r="http://schemas.openxmlformats.org/officeDocument/2006/relationships" xmlns:p="http://schemas.openxmlformats.org/presentationml/2006/main" type="objTx" preserve="1">
+  <p:cSld name="内容与标题">
+    <p:spTree>
+      <p:nvGrpSpPr>
+        <p:cNvPr id="1" name=""/>
+        <p:cNvGrpSpPr/>
+        <p:nvPr/>
+      </p:nvGrpSpPr>
+      <p:grpSpPr>
+        <a:xfrm>
+          <a:off x="0" y="0"/>
+          <a:ext cx="0" cy="0"/>
+          <a:chOff x="0" y="0"/>
+          <a:chExt cx="0" cy="0"/>
+        </a:xfrm>
+      </p:grpSpPr>
+      <p:sp>
+        <p:nvSpPr>
+          <p:cNvPr id="2" name="标题 1"/>
+          <p:cNvSpPr>
+            <a:spLocks noGrp="1"/>
+          </p:cNvSpPr>
+          <p:nvPr>
+            <p:ph type="title"/>
+          </p:nvPr>
+        </p:nvSpPr>
+        <p:spPr>
+          <a:xfrm>
+            <a:off x="839788" y="457200"/>
+            <a:ext cx="3932237" cy="1600200"/>
+          </a:xfrm>
+        </p:spPr>
+        <p:txBody>
+          <a:bodyPr anchor="b"/>
+          <a:lstStyle>
+            <a:lvl1pPr>
+              <a:defRPr sz="3200"/>
+            </a:lvl1pPr>
+          </a:lstStyle>
+          <a:p>
+            <a:r>
+              <a:rPr lang="zh-CN" altLang="en-US"/>
+              <a:t>单击此处编辑母版标题样式</a:t>
+            </a:r>
+            <a:endParaRPr lang="zh-CN" altLang="en-US"/>
+          </a:p>
+        </p:txBody>
+      </p:sp>
+      <p:sp>
+        <p:nvSpPr>
+          <p:cNvPr id="3" name="内容占位符 2"/>
+          <p:cNvSpPr>
+            <a:spLocks noGrp="1"/>
+          </p:cNvSpPr>
+          <p:nvPr>
+            <p:ph idx="1"/>
+          </p:nvPr>
+        </p:nvSpPr>
+        <p:spPr>
+          <a:xfrm>
+            <a:off x="5183188" y="987425"/>
+            <a:ext cx="6172200" cy="4873625"/>
+          </a:xfrm>
+        </p:spPr>
+        <p:txBody>
+          <a:bodyPr/>
+          <a:lstStyle>
+            <a:lvl1pPr>
+              <a:defRPr sz="3200"/>
+            </a:lvl1pPr>
+            <a:lvl2pPr>
+              <a:defRPr sz="2800"/>
+            </a:lvl2pPr>
+            <a:lvl3pPr>
+              <a:defRPr sz="2400"/>
+            </a:lvl3pPr>
+            <a:lvl4pPr>
+              <a:defRPr sz="2000"/>
+            </a:lvl4pPr>
+            <a:lvl5pPr>
+              <a:defRPr sz="2000"/>
+            </a:lvl5pPr>
+            <a:lvl6pPr>
+              <a:defRPr sz="2000"/>
+            </a:lvl6pPr>
+            <a:lvl7pPr>
+              <a:defRPr sz="2000"/>
+            </a:lvl7pPr>
+            <a:lvl8pPr>
+              <a:defRPr sz="2000"/>
+            </a:lvl8pPr>
+            <a:lvl9pPr>
+              <a:defRPr sz="2000"/>
+            </a:lvl9pPr>
+          </a:lstStyle>
+          <a:p>
+            <a:pPr lvl="0"/>
+            <a:r>
+              <a:rPr lang="zh-CN" altLang="en-US"/>
+              <a:t>单击此处编辑母版文本样式</a:t>
+            </a:r>
+            <a:endParaRPr lang="zh-CN" altLang="en-US"/>
+          </a:p>
+          <a:p>
+            <a:pPr lvl="1"/>
+            <a:r>
+              <a:rPr lang="zh-CN" altLang="en-US"/>
+              <a:t>二级</a:t>
+            </a:r>
+            <a:endParaRPr lang="zh-CN" altLang="en-US"/>
+          </a:p>
+          <a:p>
+            <a:pPr lvl="2"/>
+            <a:r>
+              <a:rPr lang="zh-CN" altLang="en-US"/>
+              <a:t>三级</a:t>
+            </a:r>
+            <a:endParaRPr lang="zh-CN" altLang="en-US"/>
+          </a:p>
+          <a:p>
+            <a:pPr lvl="3"/>
+            <a:r>
+              <a:rPr lang="zh-CN" altLang="en-US"/>
+              <a:t>四级</a:t>
+            </a:r>
+            <a:endParaRPr lang="zh-CN" altLang="en-US"/>
+          </a:p>
+          <a:p>
+            <a:pPr lvl="4"/>
+            <a:r>
+              <a:rPr lang="zh-CN" altLang="en-US"/>
+              <a:t>五级</a:t>
+            </a:r>
+            <a:endParaRPr lang="zh-CN" altLang="en-US"/>
+          </a:p>
+        </p:txBody>
+      </p:sp>
+      <p:sp>
+        <p:nvSpPr>
+          <p:cNvPr id="4" name="文本占位符 3"/>
+          <p:cNvSpPr>
+            <a:spLocks noGrp="1"/>
+          </p:cNvSpPr>
+          <p:nvPr>
+            <p:ph type="body" sz="half" idx="2"/>
+          </p:nvPr>
+        </p:nvSpPr>
+        <p:spPr>
+          <a:xfrm>
+            <a:off x="839788" y="2057400"/>
+            <a:ext cx="3932237" cy="3811588"/>
+          </a:xfrm>
+        </p:spPr>
+        <p:txBody>
+          <a:bodyPr/>
+          <a:lstStyle>
+            <a:lvl1pPr marL="0" indent="0">
+              <a:buNone/>
+              <a:defRPr sz="1600"/>
+            </a:lvl1pPr>
+            <a:lvl2pPr marL="457200" indent="0">
+              <a:buNone/>
+              <a:defRPr sz="1400"/>
+            </a:lvl2pPr>
+            <a:lvl3pPr marL="914400" indent="0">
+              <a:buNone/>
+              <a:defRPr sz="1200"/>
+            </a:lvl3pPr>
+            <a:lvl4pPr marL="1371600" indent="0">
+              <a:buNone/>
+              <a:defRPr sz="1000"/>
+            </a:lvl4pPr>
+            <a:lvl5pPr marL="1828800" indent="0">
+              <a:buNone/>
+              <a:defRPr sz="1000"/>
+            </a:lvl5pPr>
+            <a:lvl6pPr marL="2286000" indent="0">
+              <a:buNone/>
+              <a:defRPr sz="1000"/>
+            </a:lvl6pPr>
+            <a:lvl7pPr marL="2743200" indent="0">
+              <a:buNone/>
+              <a:defRPr sz="1000"/>
+            </a:lvl7pPr>
+            <a:lvl8pPr marL="3200400" indent="0">
+              <a:buNone/>
+              <a:defRPr sz="1000"/>
+            </a:lvl8pPr>
+            <a:lvl9pPr marL="3657600" indent="0">
+              <a:buNone/>
+              <a:defRPr sz="1000"/>
+            </a:lvl9pPr>
+          </a:lstStyle>
+          <a:p>
+            <a:pPr lvl="0"/>
+            <a:r>
+              <a:rPr lang="zh-CN" altLang="en-US"/>
+              <a:t>单击此处编辑母版文本样式</a:t>
+            </a:r>
+            <a:endParaRPr lang="zh-CN" altLang="en-US"/>
+          </a:p>
+        </p:txBody>
+      </p:sp>
+      <p:sp>
+        <p:nvSpPr>
+          <p:cNvPr id="5" name="日期占位符 4"/>
+          <p:cNvSpPr>
+            <a:spLocks noGrp="1"/>
+          </p:cNvSpPr>
+          <p:nvPr>
+            <p:ph type="dt" sz="half" idx="10"/>
+          </p:nvPr>
+        </p:nvSpPr>
+        <p:spPr/>
+        <p:txBody>
+          <a:bodyPr/>
+          <a:lstStyle/>
+          <a:p>
+            <a:fld id="{51FD5836-1B78-4E70-983F-F8F353C30F27}" type="datetimeFigureOut">
+              <a:rPr lang="zh-CN" altLang="en-US" smtClean="0"/>
+            </a:fld>
+            <a:endParaRPr lang="zh-CN" altLang="en-US"/>
+          </a:p>
+        </p:txBody>
+      </p:sp>
+      <p:sp>
+        <p:nvSpPr>
+          <p:cNvPr id="6" name="页脚占位符 5"/>
+          <p:cNvSpPr>
+            <a:spLocks noGrp="1"/>
+          </p:cNvSpPr>
+          <p:nvPr>
+            <p:ph type="ftr" sz="quarter" idx="11"/>
+          </p:nvPr>
+        </p:nvSpPr>
+        <p:spPr/>
+        <p:txBody>
+          <a:bodyPr/>
+          <a:lstStyle/>
+          <a:p>
+            <a:endParaRPr lang="zh-CN" altLang="en-US"/>
+          </a:p>
+        </p:txBody>
+      </p:sp>
+      <p:sp>
+        <p:nvSpPr>
+          <p:cNvPr id="7" name="灯片编号占位符 6"/>
+          <p:cNvSpPr>
+            <a:spLocks noGrp="1"/>
+          </p:cNvSpPr>
+          <p:nvPr>
+            <p:ph type="sldNum" sz="quarter" idx="12"/>
+          </p:nvPr>
+        </p:nvSpPr>
+        <p:spPr/>
+        <p:txBody>
+          <a:bodyPr/>
+          <a:lstStyle/>
+          <a:p>
+            <a:fld id="{AB80B9A9-C03D-4F64-ADE2-7C0EC2978D5F}" type="slidenum">
+              <a:rPr lang="zh-CN" altLang="en-US" smtClean="0"/>
+            </a:fld>
+            <a:endParaRPr lang="zh-CN" altLang="en-US"/>
+          </a:p>
+        </p:txBody>
+      </p:sp>
+    </p:spTree>
+  </p:cSld>
+  <p:clrMapOvr>
+    <a:masterClrMapping/>
+  </p:clrMapOvr>
+</p:sldLayout>
+</file>
+
 <file path=ppt/slideLayouts/slideLayout2.xml><?xml version="1.0" encoding="utf-8"?>
 <p:sldLayout xmlns:a="http://schemas.openxmlformats.org/drawingml/2006/main" xmlns:r="http://schemas.openxmlformats.org/officeDocument/2006/relationships" xmlns:p="http://schemas.openxmlformats.org/presentationml/2006/main" type="obj" preserve="1">
   <p:cSld name="标题和内容">
@@ -716,6 +2386,597 @@
         <p:spPr/>
         <p:txBody>
           <a:bodyPr/>
+          <a:lstStyle/>
+          <a:p>
+            <a:pPr lvl="0"/>
+            <a:r>
+              <a:rPr lang="zh-CN" altLang="en-US"/>
+              <a:t>单击此处编辑母版文本样式</a:t>
+            </a:r>
+            <a:endParaRPr lang="zh-CN" altLang="en-US"/>
+          </a:p>
+          <a:p>
+            <a:pPr lvl="1"/>
+            <a:r>
+              <a:rPr lang="zh-CN" altLang="en-US"/>
+              <a:t>二级</a:t>
+            </a:r>
+            <a:endParaRPr lang="zh-CN" altLang="en-US"/>
+          </a:p>
+          <a:p>
+            <a:pPr lvl="2"/>
+            <a:r>
+              <a:rPr lang="zh-CN" altLang="en-US"/>
+              <a:t>三级</a:t>
+            </a:r>
+            <a:endParaRPr lang="zh-CN" altLang="en-US"/>
+          </a:p>
+          <a:p>
+            <a:pPr lvl="3"/>
+            <a:r>
+              <a:rPr lang="zh-CN" altLang="en-US"/>
+              <a:t>四级</a:t>
+            </a:r>
+            <a:endParaRPr lang="zh-CN" altLang="en-US"/>
+          </a:p>
+          <a:p>
+            <a:pPr lvl="4"/>
+            <a:r>
+              <a:rPr lang="zh-CN" altLang="en-US"/>
+              <a:t>五级</a:t>
+            </a:r>
+            <a:endParaRPr lang="zh-CN" altLang="en-US"/>
+          </a:p>
+        </p:txBody>
+      </p:sp>
+      <p:sp>
+        <p:nvSpPr>
+          <p:cNvPr id="4" name="日期占位符 3"/>
+          <p:cNvSpPr>
+            <a:spLocks noGrp="1"/>
+          </p:cNvSpPr>
+          <p:nvPr>
+            <p:ph type="dt" sz="half" idx="10"/>
+          </p:nvPr>
+        </p:nvSpPr>
+        <p:spPr/>
+        <p:txBody>
+          <a:bodyPr/>
+          <a:lstStyle/>
+          <a:p>
+            <a:fld id="{51FD5836-1B78-4E70-983F-F8F353C30F27}" type="datetimeFigureOut">
+              <a:rPr lang="zh-CN" altLang="en-US" smtClean="0"/>
+            </a:fld>
+            <a:endParaRPr lang="zh-CN" altLang="en-US"/>
+          </a:p>
+        </p:txBody>
+      </p:sp>
+      <p:sp>
+        <p:nvSpPr>
+          <p:cNvPr id="5" name="页脚占位符 4"/>
+          <p:cNvSpPr>
+            <a:spLocks noGrp="1"/>
+          </p:cNvSpPr>
+          <p:nvPr>
+            <p:ph type="ftr" sz="quarter" idx="11"/>
+          </p:nvPr>
+        </p:nvSpPr>
+        <p:spPr/>
+        <p:txBody>
+          <a:bodyPr/>
+          <a:lstStyle/>
+          <a:p>
+            <a:endParaRPr lang="zh-CN" altLang="en-US"/>
+          </a:p>
+        </p:txBody>
+      </p:sp>
+      <p:sp>
+        <p:nvSpPr>
+          <p:cNvPr id="6" name="灯片编号占位符 5"/>
+          <p:cNvSpPr>
+            <a:spLocks noGrp="1"/>
+          </p:cNvSpPr>
+          <p:nvPr>
+            <p:ph type="sldNum" sz="quarter" idx="12"/>
+          </p:nvPr>
+        </p:nvSpPr>
+        <p:spPr/>
+        <p:txBody>
+          <a:bodyPr/>
+          <a:lstStyle/>
+          <a:p>
+            <a:fld id="{AB80B9A9-C03D-4F64-ADE2-7C0EC2978D5F}" type="slidenum">
+              <a:rPr lang="zh-CN" altLang="en-US" smtClean="0"/>
+            </a:fld>
+            <a:endParaRPr lang="zh-CN" altLang="en-US"/>
+          </a:p>
+        </p:txBody>
+      </p:sp>
+    </p:spTree>
+  </p:cSld>
+  <p:clrMapOvr>
+    <a:masterClrMapping/>
+  </p:clrMapOvr>
+</p:sldLayout>
+</file>
+
+<file path=ppt/slideLayouts/slideLayout20.xml><?xml version="1.0" encoding="utf-8"?>
+<p:sldLayout xmlns:a="http://schemas.openxmlformats.org/drawingml/2006/main" xmlns:r="http://schemas.openxmlformats.org/officeDocument/2006/relationships" xmlns:p="http://schemas.openxmlformats.org/presentationml/2006/main" type="picTx" preserve="1">
+  <p:cSld name="图片与标题">
+    <p:spTree>
+      <p:nvGrpSpPr>
+        <p:cNvPr id="1" name=""/>
+        <p:cNvGrpSpPr/>
+        <p:nvPr/>
+      </p:nvGrpSpPr>
+      <p:grpSpPr>
+        <a:xfrm>
+          <a:off x="0" y="0"/>
+          <a:ext cx="0" cy="0"/>
+          <a:chOff x="0" y="0"/>
+          <a:chExt cx="0" cy="0"/>
+        </a:xfrm>
+      </p:grpSpPr>
+      <p:sp>
+        <p:nvSpPr>
+          <p:cNvPr id="2" name="标题 1"/>
+          <p:cNvSpPr>
+            <a:spLocks noGrp="1"/>
+          </p:cNvSpPr>
+          <p:nvPr>
+            <p:ph type="title"/>
+          </p:nvPr>
+        </p:nvSpPr>
+        <p:spPr>
+          <a:xfrm>
+            <a:off x="839788" y="457200"/>
+            <a:ext cx="3932237" cy="1600200"/>
+          </a:xfrm>
+        </p:spPr>
+        <p:txBody>
+          <a:bodyPr anchor="b"/>
+          <a:lstStyle>
+            <a:lvl1pPr>
+              <a:defRPr sz="3200"/>
+            </a:lvl1pPr>
+          </a:lstStyle>
+          <a:p>
+            <a:r>
+              <a:rPr lang="zh-CN" altLang="en-US"/>
+              <a:t>单击此处编辑母版标题样式</a:t>
+            </a:r>
+            <a:endParaRPr lang="zh-CN" altLang="en-US"/>
+          </a:p>
+        </p:txBody>
+      </p:sp>
+      <p:sp>
+        <p:nvSpPr>
+          <p:cNvPr id="3" name="图片占位符 2"/>
+          <p:cNvSpPr>
+            <a:spLocks noGrp="1"/>
+          </p:cNvSpPr>
+          <p:nvPr>
+            <p:ph type="pic" idx="1"/>
+          </p:nvPr>
+        </p:nvSpPr>
+        <p:spPr>
+          <a:xfrm>
+            <a:off x="5183188" y="987425"/>
+            <a:ext cx="6172200" cy="4873625"/>
+          </a:xfrm>
+        </p:spPr>
+        <p:txBody>
+          <a:bodyPr/>
+          <a:lstStyle>
+            <a:lvl1pPr marL="0" indent="0">
+              <a:buNone/>
+              <a:defRPr sz="3200"/>
+            </a:lvl1pPr>
+            <a:lvl2pPr marL="457200" indent="0">
+              <a:buNone/>
+              <a:defRPr sz="2800"/>
+            </a:lvl2pPr>
+            <a:lvl3pPr marL="914400" indent="0">
+              <a:buNone/>
+              <a:defRPr sz="2400"/>
+            </a:lvl3pPr>
+            <a:lvl4pPr marL="1371600" indent="0">
+              <a:buNone/>
+              <a:defRPr sz="2000"/>
+            </a:lvl4pPr>
+            <a:lvl5pPr marL="1828800" indent="0">
+              <a:buNone/>
+              <a:defRPr sz="2000"/>
+            </a:lvl5pPr>
+            <a:lvl6pPr marL="2286000" indent="0">
+              <a:buNone/>
+              <a:defRPr sz="2000"/>
+            </a:lvl6pPr>
+            <a:lvl7pPr marL="2743200" indent="0">
+              <a:buNone/>
+              <a:defRPr sz="2000"/>
+            </a:lvl7pPr>
+            <a:lvl8pPr marL="3200400" indent="0">
+              <a:buNone/>
+              <a:defRPr sz="2000"/>
+            </a:lvl8pPr>
+            <a:lvl9pPr marL="3657600" indent="0">
+              <a:buNone/>
+              <a:defRPr sz="2000"/>
+            </a:lvl9pPr>
+          </a:lstStyle>
+          <a:p>
+            <a:endParaRPr lang="zh-CN" altLang="en-US"/>
+          </a:p>
+        </p:txBody>
+      </p:sp>
+      <p:sp>
+        <p:nvSpPr>
+          <p:cNvPr id="4" name="文本占位符 3"/>
+          <p:cNvSpPr>
+            <a:spLocks noGrp="1"/>
+          </p:cNvSpPr>
+          <p:nvPr>
+            <p:ph type="body" sz="half" idx="2"/>
+          </p:nvPr>
+        </p:nvSpPr>
+        <p:spPr>
+          <a:xfrm>
+            <a:off x="839788" y="2057400"/>
+            <a:ext cx="3932237" cy="3811588"/>
+          </a:xfrm>
+        </p:spPr>
+        <p:txBody>
+          <a:bodyPr/>
+          <a:lstStyle>
+            <a:lvl1pPr marL="0" indent="0">
+              <a:buNone/>
+              <a:defRPr sz="1600"/>
+            </a:lvl1pPr>
+            <a:lvl2pPr marL="457200" indent="0">
+              <a:buNone/>
+              <a:defRPr sz="1400"/>
+            </a:lvl2pPr>
+            <a:lvl3pPr marL="914400" indent="0">
+              <a:buNone/>
+              <a:defRPr sz="1200"/>
+            </a:lvl3pPr>
+            <a:lvl4pPr marL="1371600" indent="0">
+              <a:buNone/>
+              <a:defRPr sz="1000"/>
+            </a:lvl4pPr>
+            <a:lvl5pPr marL="1828800" indent="0">
+              <a:buNone/>
+              <a:defRPr sz="1000"/>
+            </a:lvl5pPr>
+            <a:lvl6pPr marL="2286000" indent="0">
+              <a:buNone/>
+              <a:defRPr sz="1000"/>
+            </a:lvl6pPr>
+            <a:lvl7pPr marL="2743200" indent="0">
+              <a:buNone/>
+              <a:defRPr sz="1000"/>
+            </a:lvl7pPr>
+            <a:lvl8pPr marL="3200400" indent="0">
+              <a:buNone/>
+              <a:defRPr sz="1000"/>
+            </a:lvl8pPr>
+            <a:lvl9pPr marL="3657600" indent="0">
+              <a:buNone/>
+              <a:defRPr sz="1000"/>
+            </a:lvl9pPr>
+          </a:lstStyle>
+          <a:p>
+            <a:pPr lvl="0"/>
+            <a:r>
+              <a:rPr lang="zh-CN" altLang="en-US"/>
+              <a:t>单击此处编辑母版文本样式</a:t>
+            </a:r>
+            <a:endParaRPr lang="zh-CN" altLang="en-US"/>
+          </a:p>
+        </p:txBody>
+      </p:sp>
+      <p:sp>
+        <p:nvSpPr>
+          <p:cNvPr id="5" name="日期占位符 4"/>
+          <p:cNvSpPr>
+            <a:spLocks noGrp="1"/>
+          </p:cNvSpPr>
+          <p:nvPr>
+            <p:ph type="dt" sz="half" idx="10"/>
+          </p:nvPr>
+        </p:nvSpPr>
+        <p:spPr/>
+        <p:txBody>
+          <a:bodyPr/>
+          <a:lstStyle/>
+          <a:p>
+            <a:fld id="{51FD5836-1B78-4E70-983F-F8F353C30F27}" type="datetimeFigureOut">
+              <a:rPr lang="zh-CN" altLang="en-US" smtClean="0"/>
+            </a:fld>
+            <a:endParaRPr lang="zh-CN" altLang="en-US"/>
+          </a:p>
+        </p:txBody>
+      </p:sp>
+      <p:sp>
+        <p:nvSpPr>
+          <p:cNvPr id="6" name="页脚占位符 5"/>
+          <p:cNvSpPr>
+            <a:spLocks noGrp="1"/>
+          </p:cNvSpPr>
+          <p:nvPr>
+            <p:ph type="ftr" sz="quarter" idx="11"/>
+          </p:nvPr>
+        </p:nvSpPr>
+        <p:spPr/>
+        <p:txBody>
+          <a:bodyPr/>
+          <a:lstStyle/>
+          <a:p>
+            <a:endParaRPr lang="zh-CN" altLang="en-US"/>
+          </a:p>
+        </p:txBody>
+      </p:sp>
+      <p:sp>
+        <p:nvSpPr>
+          <p:cNvPr id="7" name="灯片编号占位符 6"/>
+          <p:cNvSpPr>
+            <a:spLocks noGrp="1"/>
+          </p:cNvSpPr>
+          <p:nvPr>
+            <p:ph type="sldNum" sz="quarter" idx="12"/>
+          </p:nvPr>
+        </p:nvSpPr>
+        <p:spPr/>
+        <p:txBody>
+          <a:bodyPr/>
+          <a:lstStyle/>
+          <a:p>
+            <a:fld id="{AB80B9A9-C03D-4F64-ADE2-7C0EC2978D5F}" type="slidenum">
+              <a:rPr lang="zh-CN" altLang="en-US" smtClean="0"/>
+            </a:fld>
+            <a:endParaRPr lang="zh-CN" altLang="en-US"/>
+          </a:p>
+        </p:txBody>
+      </p:sp>
+    </p:spTree>
+  </p:cSld>
+  <p:clrMapOvr>
+    <a:masterClrMapping/>
+  </p:clrMapOvr>
+</p:sldLayout>
+</file>
+
+<file path=ppt/slideLayouts/slideLayout21.xml><?xml version="1.0" encoding="utf-8"?>
+<p:sldLayout xmlns:a="http://schemas.openxmlformats.org/drawingml/2006/main" xmlns:r="http://schemas.openxmlformats.org/officeDocument/2006/relationships" xmlns:p="http://schemas.openxmlformats.org/presentationml/2006/main" type="vertTx" preserve="1">
+  <p:cSld name="标题和竖排文字">
+    <p:spTree>
+      <p:nvGrpSpPr>
+        <p:cNvPr id="1" name=""/>
+        <p:cNvGrpSpPr/>
+        <p:nvPr/>
+      </p:nvGrpSpPr>
+      <p:grpSpPr>
+        <a:xfrm>
+          <a:off x="0" y="0"/>
+          <a:ext cx="0" cy="0"/>
+          <a:chOff x="0" y="0"/>
+          <a:chExt cx="0" cy="0"/>
+        </a:xfrm>
+      </p:grpSpPr>
+      <p:sp>
+        <p:nvSpPr>
+          <p:cNvPr id="2" name="标题 1"/>
+          <p:cNvSpPr>
+            <a:spLocks noGrp="1"/>
+          </p:cNvSpPr>
+          <p:nvPr>
+            <p:ph type="title"/>
+          </p:nvPr>
+        </p:nvSpPr>
+        <p:spPr/>
+        <p:txBody>
+          <a:bodyPr/>
+          <a:lstStyle/>
+          <a:p>
+            <a:r>
+              <a:rPr lang="zh-CN" altLang="en-US"/>
+              <a:t>单击此处编辑母版标题样式</a:t>
+            </a:r>
+            <a:endParaRPr lang="zh-CN" altLang="en-US"/>
+          </a:p>
+        </p:txBody>
+      </p:sp>
+      <p:sp>
+        <p:nvSpPr>
+          <p:cNvPr id="3" name="竖排文字占位符 2"/>
+          <p:cNvSpPr>
+            <a:spLocks noGrp="1"/>
+          </p:cNvSpPr>
+          <p:nvPr>
+            <p:ph type="body" orient="vert" idx="1"/>
+          </p:nvPr>
+        </p:nvSpPr>
+        <p:spPr/>
+        <p:txBody>
+          <a:bodyPr vert="eaVert"/>
+          <a:lstStyle/>
+          <a:p>
+            <a:pPr lvl="0"/>
+            <a:r>
+              <a:rPr lang="zh-CN" altLang="en-US"/>
+              <a:t>单击此处编辑母版文本样式</a:t>
+            </a:r>
+            <a:endParaRPr lang="zh-CN" altLang="en-US"/>
+          </a:p>
+          <a:p>
+            <a:pPr lvl="1"/>
+            <a:r>
+              <a:rPr lang="zh-CN" altLang="en-US"/>
+              <a:t>二级</a:t>
+            </a:r>
+            <a:endParaRPr lang="zh-CN" altLang="en-US"/>
+          </a:p>
+          <a:p>
+            <a:pPr lvl="2"/>
+            <a:r>
+              <a:rPr lang="zh-CN" altLang="en-US"/>
+              <a:t>三级</a:t>
+            </a:r>
+            <a:endParaRPr lang="zh-CN" altLang="en-US"/>
+          </a:p>
+          <a:p>
+            <a:pPr lvl="3"/>
+            <a:r>
+              <a:rPr lang="zh-CN" altLang="en-US"/>
+              <a:t>四级</a:t>
+            </a:r>
+            <a:endParaRPr lang="zh-CN" altLang="en-US"/>
+          </a:p>
+          <a:p>
+            <a:pPr lvl="4"/>
+            <a:r>
+              <a:rPr lang="zh-CN" altLang="en-US"/>
+              <a:t>五级</a:t>
+            </a:r>
+            <a:endParaRPr lang="zh-CN" altLang="en-US"/>
+          </a:p>
+        </p:txBody>
+      </p:sp>
+      <p:sp>
+        <p:nvSpPr>
+          <p:cNvPr id="4" name="日期占位符 3"/>
+          <p:cNvSpPr>
+            <a:spLocks noGrp="1"/>
+          </p:cNvSpPr>
+          <p:nvPr>
+            <p:ph type="dt" sz="half" idx="10"/>
+          </p:nvPr>
+        </p:nvSpPr>
+        <p:spPr/>
+        <p:txBody>
+          <a:bodyPr/>
+          <a:lstStyle/>
+          <a:p>
+            <a:fld id="{51FD5836-1B78-4E70-983F-F8F353C30F27}" type="datetimeFigureOut">
+              <a:rPr lang="zh-CN" altLang="en-US" smtClean="0"/>
+            </a:fld>
+            <a:endParaRPr lang="zh-CN" altLang="en-US"/>
+          </a:p>
+        </p:txBody>
+      </p:sp>
+      <p:sp>
+        <p:nvSpPr>
+          <p:cNvPr id="5" name="页脚占位符 4"/>
+          <p:cNvSpPr>
+            <a:spLocks noGrp="1"/>
+          </p:cNvSpPr>
+          <p:nvPr>
+            <p:ph type="ftr" sz="quarter" idx="11"/>
+          </p:nvPr>
+        </p:nvSpPr>
+        <p:spPr/>
+        <p:txBody>
+          <a:bodyPr/>
+          <a:lstStyle/>
+          <a:p>
+            <a:endParaRPr lang="zh-CN" altLang="en-US"/>
+          </a:p>
+        </p:txBody>
+      </p:sp>
+      <p:sp>
+        <p:nvSpPr>
+          <p:cNvPr id="6" name="灯片编号占位符 5"/>
+          <p:cNvSpPr>
+            <a:spLocks noGrp="1"/>
+          </p:cNvSpPr>
+          <p:nvPr>
+            <p:ph type="sldNum" sz="quarter" idx="12"/>
+          </p:nvPr>
+        </p:nvSpPr>
+        <p:spPr/>
+        <p:txBody>
+          <a:bodyPr/>
+          <a:lstStyle/>
+          <a:p>
+            <a:fld id="{AB80B9A9-C03D-4F64-ADE2-7C0EC2978D5F}" type="slidenum">
+              <a:rPr lang="zh-CN" altLang="en-US" smtClean="0"/>
+            </a:fld>
+            <a:endParaRPr lang="zh-CN" altLang="en-US"/>
+          </a:p>
+        </p:txBody>
+      </p:sp>
+    </p:spTree>
+  </p:cSld>
+  <p:clrMapOvr>
+    <a:masterClrMapping/>
+  </p:clrMapOvr>
+</p:sldLayout>
+</file>
+
+<file path=ppt/slideLayouts/slideLayout22.xml><?xml version="1.0" encoding="utf-8"?>
+<p:sldLayout xmlns:a="http://schemas.openxmlformats.org/drawingml/2006/main" xmlns:r="http://schemas.openxmlformats.org/officeDocument/2006/relationships" xmlns:p="http://schemas.openxmlformats.org/presentationml/2006/main" type="vertTitleAndTx" preserve="1">
+  <p:cSld name="竖排标题与文本">
+    <p:spTree>
+      <p:nvGrpSpPr>
+        <p:cNvPr id="1" name=""/>
+        <p:cNvGrpSpPr/>
+        <p:nvPr/>
+      </p:nvGrpSpPr>
+      <p:grpSpPr>
+        <a:xfrm>
+          <a:off x="0" y="0"/>
+          <a:ext cx="0" cy="0"/>
+          <a:chOff x="0" y="0"/>
+          <a:chExt cx="0" cy="0"/>
+        </a:xfrm>
+      </p:grpSpPr>
+      <p:sp>
+        <p:nvSpPr>
+          <p:cNvPr id="2" name="竖排标题 1"/>
+          <p:cNvSpPr>
+            <a:spLocks noGrp="1"/>
+          </p:cNvSpPr>
+          <p:nvPr>
+            <p:ph type="title" orient="vert"/>
+          </p:nvPr>
+        </p:nvSpPr>
+        <p:spPr>
+          <a:xfrm>
+            <a:off x="8724900" y="365125"/>
+            <a:ext cx="2628900" cy="5811838"/>
+          </a:xfrm>
+        </p:spPr>
+        <p:txBody>
+          <a:bodyPr vert="eaVert"/>
+          <a:lstStyle/>
+          <a:p>
+            <a:r>
+              <a:rPr lang="zh-CN" altLang="en-US"/>
+              <a:t>单击此处编辑母版标题样式</a:t>
+            </a:r>
+            <a:endParaRPr lang="zh-CN" altLang="en-US"/>
+          </a:p>
+        </p:txBody>
+      </p:sp>
+      <p:sp>
+        <p:nvSpPr>
+          <p:cNvPr id="3" name="竖排文字占位符 2"/>
+          <p:cNvSpPr>
+            <a:spLocks noGrp="1"/>
+          </p:cNvSpPr>
+          <p:nvPr>
+            <p:ph type="body" orient="vert" idx="1"/>
+          </p:nvPr>
+        </p:nvSpPr>
+        <p:spPr>
+          <a:xfrm>
+            <a:off x="838200" y="365125"/>
+            <a:ext cx="7734300" cy="5811838"/>
+          </a:xfrm>
+        </p:spPr>
+        <p:txBody>
+          <a:bodyPr vert="eaVert"/>
           <a:lstStyle/>
           <a:p>
             <a:pPr lvl="0"/>
@@ -2647,6 +4908,543 @@
     <p:sldLayoutId id="2147483657" r:id="rId9"/>
     <p:sldLayoutId id="2147483658" r:id="rId10"/>
     <p:sldLayoutId id="2147483659" r:id="rId11"/>
+  </p:sldLayoutIdLst>
+  <p:txStyles>
+    <p:titleStyle>
+      <a:lvl1pPr algn="l" defTabSz="914400" rtl="0" eaLnBrk="1" latinLnBrk="0" hangingPunct="1">
+        <a:lnSpc>
+          <a:spcPct val="90000"/>
+        </a:lnSpc>
+        <a:spcBef>
+          <a:spcPct val="0"/>
+        </a:spcBef>
+        <a:buNone/>
+        <a:defRPr sz="4400" kern="1200">
+          <a:solidFill>
+            <a:schemeClr val="tx1"/>
+          </a:solidFill>
+          <a:latin typeface="+mj-lt"/>
+          <a:ea typeface="+mj-ea"/>
+          <a:cs typeface="+mj-cs"/>
+        </a:defRPr>
+      </a:lvl1pPr>
+    </p:titleStyle>
+    <p:bodyStyle>
+      <a:lvl1pPr marL="228600" indent="-228600" algn="l" defTabSz="914400" rtl="0" eaLnBrk="1" latinLnBrk="0" hangingPunct="1">
+        <a:lnSpc>
+          <a:spcPct val="90000"/>
+        </a:lnSpc>
+        <a:spcBef>
+          <a:spcPts val="1000"/>
+        </a:spcBef>
+        <a:buFont typeface="Arial" panose="020B0604020202090204" pitchFamily="34" charset="0"/>
+        <a:buChar char="•"/>
+        <a:defRPr sz="2800" kern="1200">
+          <a:solidFill>
+            <a:schemeClr val="tx1"/>
+          </a:solidFill>
+          <a:latin typeface="+mn-lt"/>
+          <a:ea typeface="+mn-ea"/>
+          <a:cs typeface="+mn-cs"/>
+        </a:defRPr>
+      </a:lvl1pPr>
+      <a:lvl2pPr marL="685800" indent="-228600" algn="l" defTabSz="914400" rtl="0" eaLnBrk="1" latinLnBrk="0" hangingPunct="1">
+        <a:lnSpc>
+          <a:spcPct val="90000"/>
+        </a:lnSpc>
+        <a:spcBef>
+          <a:spcPts val="500"/>
+        </a:spcBef>
+        <a:buFont typeface="Arial" panose="020B0604020202090204" pitchFamily="34" charset="0"/>
+        <a:buChar char="•"/>
+        <a:defRPr sz="2400" kern="1200">
+          <a:solidFill>
+            <a:schemeClr val="tx1"/>
+          </a:solidFill>
+          <a:latin typeface="+mn-lt"/>
+          <a:ea typeface="+mn-ea"/>
+          <a:cs typeface="+mn-cs"/>
+        </a:defRPr>
+      </a:lvl2pPr>
+      <a:lvl3pPr marL="1143000" indent="-228600" algn="l" defTabSz="914400" rtl="0" eaLnBrk="1" latinLnBrk="0" hangingPunct="1">
+        <a:lnSpc>
+          <a:spcPct val="90000"/>
+        </a:lnSpc>
+        <a:spcBef>
+          <a:spcPts val="500"/>
+        </a:spcBef>
+        <a:buFont typeface="Arial" panose="020B0604020202090204" pitchFamily="34" charset="0"/>
+        <a:buChar char="•"/>
+        <a:defRPr sz="2000" kern="1200">
+          <a:solidFill>
+            <a:schemeClr val="tx1"/>
+          </a:solidFill>
+          <a:latin typeface="+mn-lt"/>
+          <a:ea typeface="+mn-ea"/>
+          <a:cs typeface="+mn-cs"/>
+        </a:defRPr>
+      </a:lvl3pPr>
+      <a:lvl4pPr marL="1600200" indent="-228600" algn="l" defTabSz="914400" rtl="0" eaLnBrk="1" latinLnBrk="0" hangingPunct="1">
+        <a:lnSpc>
+          <a:spcPct val="90000"/>
+        </a:lnSpc>
+        <a:spcBef>
+          <a:spcPts val="500"/>
+        </a:spcBef>
+        <a:buFont typeface="Arial" panose="020B0604020202090204" pitchFamily="34" charset="0"/>
+        <a:buChar char="•"/>
+        <a:defRPr sz="1800" kern="1200">
+          <a:solidFill>
+            <a:schemeClr val="tx1"/>
+          </a:solidFill>
+          <a:latin typeface="+mn-lt"/>
+          <a:ea typeface="+mn-ea"/>
+          <a:cs typeface="+mn-cs"/>
+        </a:defRPr>
+      </a:lvl4pPr>
+      <a:lvl5pPr marL="2057400" indent="-228600" algn="l" defTabSz="914400" rtl="0" eaLnBrk="1" latinLnBrk="0" hangingPunct="1">
+        <a:lnSpc>
+          <a:spcPct val="90000"/>
+        </a:lnSpc>
+        <a:spcBef>
+          <a:spcPts val="500"/>
+        </a:spcBef>
+        <a:buFont typeface="Arial" panose="020B0604020202090204" pitchFamily="34" charset="0"/>
+        <a:buChar char="•"/>
+        <a:defRPr sz="1800" kern="1200">
+          <a:solidFill>
+            <a:schemeClr val="tx1"/>
+          </a:solidFill>
+          <a:latin typeface="+mn-lt"/>
+          <a:ea typeface="+mn-ea"/>
+          <a:cs typeface="+mn-cs"/>
+        </a:defRPr>
+      </a:lvl5pPr>
+      <a:lvl6pPr marL="2514600" indent="-228600" algn="l" defTabSz="914400" rtl="0" eaLnBrk="1" latinLnBrk="0" hangingPunct="1">
+        <a:lnSpc>
+          <a:spcPct val="90000"/>
+        </a:lnSpc>
+        <a:spcBef>
+          <a:spcPts val="500"/>
+        </a:spcBef>
+        <a:buFont typeface="Arial" panose="020B0604020202090204" pitchFamily="34" charset="0"/>
+        <a:buChar char="•"/>
+        <a:defRPr sz="1800" kern="1200">
+          <a:solidFill>
+            <a:schemeClr val="tx1"/>
+          </a:solidFill>
+          <a:latin typeface="+mn-lt"/>
+          <a:ea typeface="+mn-ea"/>
+          <a:cs typeface="+mn-cs"/>
+        </a:defRPr>
+      </a:lvl6pPr>
+      <a:lvl7pPr marL="2971800" indent="-228600" algn="l" defTabSz="914400" rtl="0" eaLnBrk="1" latinLnBrk="0" hangingPunct="1">
+        <a:lnSpc>
+          <a:spcPct val="90000"/>
+        </a:lnSpc>
+        <a:spcBef>
+          <a:spcPts val="500"/>
+        </a:spcBef>
+        <a:buFont typeface="Arial" panose="020B0604020202090204" pitchFamily="34" charset="0"/>
+        <a:buChar char="•"/>
+        <a:defRPr sz="1800" kern="1200">
+          <a:solidFill>
+            <a:schemeClr val="tx1"/>
+          </a:solidFill>
+          <a:latin typeface="+mn-lt"/>
+          <a:ea typeface="+mn-ea"/>
+          <a:cs typeface="+mn-cs"/>
+        </a:defRPr>
+      </a:lvl7pPr>
+      <a:lvl8pPr marL="3429000" indent="-228600" algn="l" defTabSz="914400" rtl="0" eaLnBrk="1" latinLnBrk="0" hangingPunct="1">
+        <a:lnSpc>
+          <a:spcPct val="90000"/>
+        </a:lnSpc>
+        <a:spcBef>
+          <a:spcPts val="500"/>
+        </a:spcBef>
+        <a:buFont typeface="Arial" panose="020B0604020202090204" pitchFamily="34" charset="0"/>
+        <a:buChar char="•"/>
+        <a:defRPr sz="1800" kern="1200">
+          <a:solidFill>
+            <a:schemeClr val="tx1"/>
+          </a:solidFill>
+          <a:latin typeface="+mn-lt"/>
+          <a:ea typeface="+mn-ea"/>
+          <a:cs typeface="+mn-cs"/>
+        </a:defRPr>
+      </a:lvl8pPr>
+      <a:lvl9pPr marL="3886200" indent="-228600" algn="l" defTabSz="914400" rtl="0" eaLnBrk="1" latinLnBrk="0" hangingPunct="1">
+        <a:lnSpc>
+          <a:spcPct val="90000"/>
+        </a:lnSpc>
+        <a:spcBef>
+          <a:spcPts val="500"/>
+        </a:spcBef>
+        <a:buFont typeface="Arial" panose="020B0604020202090204" pitchFamily="34" charset="0"/>
+        <a:buChar char="•"/>
+        <a:defRPr sz="1800" kern="1200">
+          <a:solidFill>
+            <a:schemeClr val="tx1"/>
+          </a:solidFill>
+          <a:latin typeface="+mn-lt"/>
+          <a:ea typeface="+mn-ea"/>
+          <a:cs typeface="+mn-cs"/>
+        </a:defRPr>
+      </a:lvl9pPr>
+    </p:bodyStyle>
+    <p:otherStyle>
+      <a:defPPr>
+        <a:defRPr lang="zh-CN"/>
+      </a:defPPr>
+      <a:lvl1pPr marL="0" algn="l" defTabSz="914400" rtl="0" eaLnBrk="1" latinLnBrk="0" hangingPunct="1">
+        <a:defRPr sz="1800" kern="1200">
+          <a:solidFill>
+            <a:schemeClr val="tx1"/>
+          </a:solidFill>
+          <a:latin typeface="+mn-lt"/>
+          <a:ea typeface="+mn-ea"/>
+          <a:cs typeface="+mn-cs"/>
+        </a:defRPr>
+      </a:lvl1pPr>
+      <a:lvl2pPr marL="457200" algn="l" defTabSz="914400" rtl="0" eaLnBrk="1" latinLnBrk="0" hangingPunct="1">
+        <a:defRPr sz="1800" kern="1200">
+          <a:solidFill>
+            <a:schemeClr val="tx1"/>
+          </a:solidFill>
+          <a:latin typeface="+mn-lt"/>
+          <a:ea typeface="+mn-ea"/>
+          <a:cs typeface="+mn-cs"/>
+        </a:defRPr>
+      </a:lvl2pPr>
+      <a:lvl3pPr marL="914400" algn="l" defTabSz="914400" rtl="0" eaLnBrk="1" latinLnBrk="0" hangingPunct="1">
+        <a:defRPr sz="1800" kern="1200">
+          <a:solidFill>
+            <a:schemeClr val="tx1"/>
+          </a:solidFill>
+          <a:latin typeface="+mn-lt"/>
+          <a:ea typeface="+mn-ea"/>
+          <a:cs typeface="+mn-cs"/>
+        </a:defRPr>
+      </a:lvl3pPr>
+      <a:lvl4pPr marL="1371600" algn="l" defTabSz="914400" rtl="0" eaLnBrk="1" latinLnBrk="0" hangingPunct="1">
+        <a:defRPr sz="1800" kern="1200">
+          <a:solidFill>
+            <a:schemeClr val="tx1"/>
+          </a:solidFill>
+          <a:latin typeface="+mn-lt"/>
+          <a:ea typeface="+mn-ea"/>
+          <a:cs typeface="+mn-cs"/>
+        </a:defRPr>
+      </a:lvl4pPr>
+      <a:lvl5pPr marL="1828800" algn="l" defTabSz="914400" rtl="0" eaLnBrk="1" latinLnBrk="0" hangingPunct="1">
+        <a:defRPr sz="1800" kern="1200">
+          <a:solidFill>
+            <a:schemeClr val="tx1"/>
+          </a:solidFill>
+          <a:latin typeface="+mn-lt"/>
+          <a:ea typeface="+mn-ea"/>
+          <a:cs typeface="+mn-cs"/>
+        </a:defRPr>
+      </a:lvl5pPr>
+      <a:lvl6pPr marL="2286000" algn="l" defTabSz="914400" rtl="0" eaLnBrk="1" latinLnBrk="0" hangingPunct="1">
+        <a:defRPr sz="1800" kern="1200">
+          <a:solidFill>
+            <a:schemeClr val="tx1"/>
+          </a:solidFill>
+          <a:latin typeface="+mn-lt"/>
+          <a:ea typeface="+mn-ea"/>
+          <a:cs typeface="+mn-cs"/>
+        </a:defRPr>
+      </a:lvl6pPr>
+      <a:lvl7pPr marL="2743200" algn="l" defTabSz="914400" rtl="0" eaLnBrk="1" latinLnBrk="0" hangingPunct="1">
+        <a:defRPr sz="1800" kern="1200">
+          <a:solidFill>
+            <a:schemeClr val="tx1"/>
+          </a:solidFill>
+          <a:latin typeface="+mn-lt"/>
+          <a:ea typeface="+mn-ea"/>
+          <a:cs typeface="+mn-cs"/>
+        </a:defRPr>
+      </a:lvl7pPr>
+      <a:lvl8pPr marL="3200400" algn="l" defTabSz="914400" rtl="0" eaLnBrk="1" latinLnBrk="0" hangingPunct="1">
+        <a:defRPr sz="1800" kern="1200">
+          <a:solidFill>
+            <a:schemeClr val="tx1"/>
+          </a:solidFill>
+          <a:latin typeface="+mn-lt"/>
+          <a:ea typeface="+mn-ea"/>
+          <a:cs typeface="+mn-cs"/>
+        </a:defRPr>
+      </a:lvl8pPr>
+      <a:lvl9pPr marL="3657600" algn="l" defTabSz="914400" rtl="0" eaLnBrk="1" latinLnBrk="0" hangingPunct="1">
+        <a:defRPr sz="1800" kern="1200">
+          <a:solidFill>
+            <a:schemeClr val="tx1"/>
+          </a:solidFill>
+          <a:latin typeface="+mn-lt"/>
+          <a:ea typeface="+mn-ea"/>
+          <a:cs typeface="+mn-cs"/>
+        </a:defRPr>
+      </a:lvl9pPr>
+    </p:otherStyle>
+  </p:txStyles>
+</p:sldMaster>
+</file>
+
+<file path=ppt/slideMasters/slideMaster2.xml><?xml version="1.0" encoding="utf-8"?>
+<p:sldMaster xmlns:a="http://schemas.openxmlformats.org/drawingml/2006/main" xmlns:r="http://schemas.openxmlformats.org/officeDocument/2006/relationships" xmlns:p="http://schemas.openxmlformats.org/presentationml/2006/main">
+  <p:cSld>
+    <p:bg>
+      <p:bgRef idx="1001">
+        <a:schemeClr val="bg1"/>
+      </p:bgRef>
+    </p:bg>
+    <p:spTree>
+      <p:nvGrpSpPr>
+        <p:cNvPr id="1" name=""/>
+        <p:cNvGrpSpPr/>
+        <p:nvPr/>
+      </p:nvGrpSpPr>
+      <p:grpSpPr>
+        <a:xfrm>
+          <a:off x="0" y="0"/>
+          <a:ext cx="0" cy="0"/>
+          <a:chOff x="0" y="0"/>
+          <a:chExt cx="0" cy="0"/>
+        </a:xfrm>
+      </p:grpSpPr>
+      <p:sp>
+        <p:nvSpPr>
+          <p:cNvPr id="2" name="标题占位符 1"/>
+          <p:cNvSpPr>
+            <a:spLocks noGrp="1"/>
+          </p:cNvSpPr>
+          <p:nvPr>
+            <p:ph type="title"/>
+          </p:nvPr>
+        </p:nvSpPr>
+        <p:spPr>
+          <a:xfrm>
+            <a:off x="838200" y="365125"/>
+            <a:ext cx="10515600" cy="1325563"/>
+          </a:xfrm>
+          <a:prstGeom prst="rect">
+            <a:avLst/>
+          </a:prstGeom>
+        </p:spPr>
+        <p:txBody>
+          <a:bodyPr vert="horz" lIns="91440" tIns="45720" rIns="91440" bIns="45720" rtlCol="0" anchor="ctr">
+            <a:normAutofit/>
+          </a:bodyPr>
+          <a:lstStyle/>
+          <a:p>
+            <a:r>
+              <a:rPr lang="zh-CN" altLang="en-US"/>
+              <a:t>单击此处编辑母版标题样式</a:t>
+            </a:r>
+            <a:endParaRPr lang="zh-CN" altLang="en-US"/>
+          </a:p>
+        </p:txBody>
+      </p:sp>
+      <p:sp>
+        <p:nvSpPr>
+          <p:cNvPr id="3" name="文本占位符 2"/>
+          <p:cNvSpPr>
+            <a:spLocks noGrp="1"/>
+          </p:cNvSpPr>
+          <p:nvPr>
+            <p:ph type="body" idx="1"/>
+          </p:nvPr>
+        </p:nvSpPr>
+        <p:spPr>
+          <a:xfrm>
+            <a:off x="838200" y="1825625"/>
+            <a:ext cx="10515600" cy="4351338"/>
+          </a:xfrm>
+          <a:prstGeom prst="rect">
+            <a:avLst/>
+          </a:prstGeom>
+        </p:spPr>
+        <p:txBody>
+          <a:bodyPr vert="horz" lIns="91440" tIns="45720" rIns="91440" bIns="45720" rtlCol="0">
+            <a:normAutofit/>
+          </a:bodyPr>
+          <a:lstStyle/>
+          <a:p>
+            <a:pPr lvl="0"/>
+            <a:r>
+              <a:rPr lang="zh-CN" altLang="en-US"/>
+              <a:t>单击此处编辑母版文本样式</a:t>
+            </a:r>
+            <a:endParaRPr lang="zh-CN" altLang="en-US"/>
+          </a:p>
+          <a:p>
+            <a:pPr lvl="1"/>
+            <a:r>
+              <a:rPr lang="zh-CN" altLang="en-US"/>
+              <a:t>二级</a:t>
+            </a:r>
+            <a:endParaRPr lang="zh-CN" altLang="en-US"/>
+          </a:p>
+          <a:p>
+            <a:pPr lvl="2"/>
+            <a:r>
+              <a:rPr lang="zh-CN" altLang="en-US"/>
+              <a:t>三级</a:t>
+            </a:r>
+            <a:endParaRPr lang="zh-CN" altLang="en-US"/>
+          </a:p>
+          <a:p>
+            <a:pPr lvl="3"/>
+            <a:r>
+              <a:rPr lang="zh-CN" altLang="en-US"/>
+              <a:t>四级</a:t>
+            </a:r>
+            <a:endParaRPr lang="zh-CN" altLang="en-US"/>
+          </a:p>
+          <a:p>
+            <a:pPr lvl="4"/>
+            <a:r>
+              <a:rPr lang="zh-CN" altLang="en-US"/>
+              <a:t>五级</a:t>
+            </a:r>
+            <a:endParaRPr lang="zh-CN" altLang="en-US"/>
+          </a:p>
+        </p:txBody>
+      </p:sp>
+      <p:sp>
+        <p:nvSpPr>
+          <p:cNvPr id="4" name="日期占位符 3"/>
+          <p:cNvSpPr>
+            <a:spLocks noGrp="1"/>
+          </p:cNvSpPr>
+          <p:nvPr>
+            <p:ph type="dt" sz="half" idx="2"/>
+          </p:nvPr>
+        </p:nvSpPr>
+        <p:spPr>
+          <a:xfrm>
+            <a:off x="838200" y="6356350"/>
+            <a:ext cx="2743200" cy="365125"/>
+          </a:xfrm>
+          <a:prstGeom prst="rect">
+            <a:avLst/>
+          </a:prstGeom>
+        </p:spPr>
+        <p:txBody>
+          <a:bodyPr vert="horz" lIns="91440" tIns="45720" rIns="91440" bIns="45720" rtlCol="0" anchor="ctr"/>
+          <a:lstStyle>
+            <a:lvl1pPr algn="l">
+              <a:defRPr sz="1200">
+                <a:solidFill>
+                  <a:schemeClr val="tx1">
+                    <a:tint val="75000"/>
+                  </a:schemeClr>
+                </a:solidFill>
+              </a:defRPr>
+            </a:lvl1pPr>
+          </a:lstStyle>
+          <a:p>
+            <a:fld id="{51FD5836-1B78-4E70-983F-F8F353C30F27}" type="datetimeFigureOut">
+              <a:rPr lang="zh-CN" altLang="en-US" smtClean="0"/>
+            </a:fld>
+            <a:endParaRPr lang="zh-CN" altLang="en-US"/>
+          </a:p>
+        </p:txBody>
+      </p:sp>
+      <p:sp>
+        <p:nvSpPr>
+          <p:cNvPr id="5" name="页脚占位符 4"/>
+          <p:cNvSpPr>
+            <a:spLocks noGrp="1"/>
+          </p:cNvSpPr>
+          <p:nvPr>
+            <p:ph type="ftr" sz="quarter" idx="3"/>
+          </p:nvPr>
+        </p:nvSpPr>
+        <p:spPr>
+          <a:xfrm>
+            <a:off x="4038600" y="6356350"/>
+            <a:ext cx="4114800" cy="365125"/>
+          </a:xfrm>
+          <a:prstGeom prst="rect">
+            <a:avLst/>
+          </a:prstGeom>
+        </p:spPr>
+        <p:txBody>
+          <a:bodyPr vert="horz" lIns="91440" tIns="45720" rIns="91440" bIns="45720" rtlCol="0" anchor="ctr"/>
+          <a:lstStyle>
+            <a:lvl1pPr algn="ctr">
+              <a:defRPr sz="1200">
+                <a:solidFill>
+                  <a:schemeClr val="tx1">
+                    <a:tint val="75000"/>
+                  </a:schemeClr>
+                </a:solidFill>
+              </a:defRPr>
+            </a:lvl1pPr>
+          </a:lstStyle>
+          <a:p>
+            <a:endParaRPr lang="zh-CN" altLang="en-US"/>
+          </a:p>
+        </p:txBody>
+      </p:sp>
+      <p:sp>
+        <p:nvSpPr>
+          <p:cNvPr id="6" name="灯片编号占位符 5"/>
+          <p:cNvSpPr>
+            <a:spLocks noGrp="1"/>
+          </p:cNvSpPr>
+          <p:nvPr>
+            <p:ph type="sldNum" sz="quarter" idx="4"/>
+          </p:nvPr>
+        </p:nvSpPr>
+        <p:spPr>
+          <a:xfrm>
+            <a:off x="8610600" y="6356350"/>
+            <a:ext cx="2743200" cy="365125"/>
+          </a:xfrm>
+          <a:prstGeom prst="rect">
+            <a:avLst/>
+          </a:prstGeom>
+        </p:spPr>
+        <p:txBody>
+          <a:bodyPr vert="horz" lIns="91440" tIns="45720" rIns="91440" bIns="45720" rtlCol="0" anchor="ctr"/>
+          <a:lstStyle>
+            <a:lvl1pPr algn="r">
+              <a:defRPr sz="1200">
+                <a:solidFill>
+                  <a:schemeClr val="tx1">
+                    <a:tint val="75000"/>
+                  </a:schemeClr>
+                </a:solidFill>
+              </a:defRPr>
+            </a:lvl1pPr>
+          </a:lstStyle>
+          <a:p>
+            <a:fld id="{AB80B9A9-C03D-4F64-ADE2-7C0EC2978D5F}" type="slidenum">
+              <a:rPr lang="zh-CN" altLang="en-US" smtClean="0"/>
+            </a:fld>
+            <a:endParaRPr lang="zh-CN" altLang="en-US"/>
+          </a:p>
+        </p:txBody>
+      </p:sp>
+    </p:spTree>
+  </p:cSld>
+  <p:clrMap bg1="lt1" tx1="dk1" bg2="lt2" tx2="dk2" accent1="accent1" accent2="accent2" accent3="accent3" accent4="accent4" accent5="accent5" accent6="accent6" hlink="hlink" folHlink="folHlink"/>
+  <p:sldLayoutIdLst>
+    <p:sldLayoutId id="2147483661" r:id="rId1"/>
+    <p:sldLayoutId id="2147483662" r:id="rId2"/>
+    <p:sldLayoutId id="2147483663" r:id="rId3"/>
+    <p:sldLayoutId id="2147483664" r:id="rId4"/>
+    <p:sldLayoutId id="2147483665" r:id="rId5"/>
+    <p:sldLayoutId id="2147483666" r:id="rId6"/>
+    <p:sldLayoutId id="2147483667" r:id="rId7"/>
+    <p:sldLayoutId id="2147483668" r:id="rId8"/>
+    <p:sldLayoutId id="2147483669" r:id="rId9"/>
+    <p:sldLayoutId id="2147483670" r:id="rId10"/>
+    <p:sldLayoutId id="2147483671" r:id="rId11"/>
   </p:sldLayoutIdLst>
   <p:txStyles>
     <p:titleStyle>
@@ -3081,33 +5879,45 @@
             <a:pPr lvl="1"/>
             <a:r>
               <a:rPr lang="en-US" altLang="zh-CN" sz="1600" dirty="0"/>
-              <a:t>Including timers, subscriptions, services, and client callbacks.</a:t>
+              <a:t>Including timer, subscription, service, and client callbacks.</a:t>
             </a:r>
             <a:endParaRPr lang="en-US" altLang="zh-CN" sz="1600" dirty="0"/>
           </a:p>
           <a:p>
             <a:pPr lvl="1"/>
             <a:r>
+              <a:rPr lang="en-US" altLang="zh-CN" sz="1600" b="1" dirty="0"/>
+              <a:t>Timer callbacks have a period (time trigger).</a:t>
+            </a:r>
+            <a:r>
               <a:rPr lang="en-US" altLang="zh-CN" sz="1600" dirty="0"/>
-              <a:t>Timer callbacks have a period (time trigger). </a:t>
+              <a:t> </a:t>
             </a:r>
             <a:endParaRPr lang="en-US" altLang="zh-CN" sz="1600" dirty="0"/>
           </a:p>
           <a:p>
             <a:pPr lvl="1"/>
             <a:r>
-              <a:rPr lang="en-US" altLang="zh-CN" sz="1600" dirty="0"/>
-              <a:t>Others are regular callbacks (event triggered)</a:t>
-            </a:r>
-            <a:endParaRPr lang="en-US" altLang="zh-CN" sz="1600" dirty="0"/>
+              <a:rPr lang="en-US" altLang="zh-CN" sz="1600" b="1" dirty="0"/>
+              <a:t>Others are regular callbacks (event trigger)</a:t>
+            </a:r>
+            <a:endParaRPr lang="en-US" altLang="zh-CN" sz="1600" b="1" dirty="0"/>
           </a:p>
           <a:p>
             <a:pPr lvl="1"/>
             <a:r>
-              <a:rPr lang="en-US" altLang="zh-CN" sz="1600" dirty="0"/>
+              <a:rPr lang="en-US" altLang="zh-CN" sz="1600" dirty="0">
+                <a:solidFill>
+                  <a:schemeClr val="accent1"/>
+                </a:solidFill>
+              </a:rPr>
               <a:t>With priority attribute: Timer&gt;Subscription&gt;Service&gt;Client</a:t>
             </a:r>
-            <a:endParaRPr lang="en-US" altLang="zh-CN" sz="1600" dirty="0"/>
+            <a:endParaRPr lang="en-US" altLang="zh-CN" sz="1600" dirty="0">
+              <a:solidFill>
+                <a:schemeClr val="accent1"/>
+              </a:solidFill>
+            </a:endParaRPr>
           </a:p>
           <a:p>
             <a:r>
@@ -3135,10 +5945,10 @@
           <a:p>
             <a:pPr lvl="1"/>
             <a:r>
-              <a:rPr lang="en-US" altLang="zh-CN" sz="1600" dirty="0"/>
+              <a:rPr lang="en-US" altLang="zh-CN" sz="1600" b="1" dirty="0"/>
               <a:t>Can only be assigned to the only executor</a:t>
             </a:r>
-            <a:endParaRPr lang="en-US" altLang="zh-CN" sz="1600" dirty="0"/>
+            <a:endParaRPr lang="en-US" altLang="zh-CN" sz="1600" b="1" dirty="0"/>
           </a:p>
           <a:p>
             <a:pPr lvl="1"/>
@@ -3175,7 +5985,11 @@
             <a:pPr lvl="1"/>
             <a:r>
               <a:rPr lang="en-US" altLang="zh-CN" sz="1600" dirty="0"/>
-              <a:t>The executor itself occupies a thread</a:t>
+              <a:t>The executor itself occupies </a:t>
+            </a:r>
+            <a:r>
+              <a:rPr lang="en-US" altLang="zh-CN" sz="1600" b="1" dirty="0"/>
+              <a:t>a thread</a:t>
             </a:r>
             <a:endParaRPr lang="en-US" altLang="zh-CN" sz="1600" dirty="0"/>
           </a:p>
@@ -3198,10 +6012,18 @@
           <a:p>
             <a:pPr lvl="1"/>
             <a:r>
-              <a:rPr lang="en-US" altLang="zh-CN" sz="1600" dirty="0"/>
+              <a:rPr lang="en-US" altLang="zh-CN" sz="1600" dirty="0">
+                <a:solidFill>
+                  <a:schemeClr val="accent1"/>
+                </a:solidFill>
+              </a:rPr>
               <a:t>Single-threaded executor: handle all callbacks in a single thread</a:t>
             </a:r>
-            <a:endParaRPr lang="en-US" altLang="zh-CN" sz="1600" dirty="0"/>
+            <a:endParaRPr lang="en-US" altLang="zh-CN" sz="1600" dirty="0">
+              <a:solidFill>
+                <a:schemeClr val="accent1"/>
+              </a:solidFill>
+            </a:endParaRPr>
           </a:p>
           <a:p>
             <a:pPr lvl="1"/>
@@ -3323,28 +6145,40 @@
           <a:lstStyle/>
           <a:p>
             <a:r>
+              <a:rPr lang="en-US" altLang="zh-CN" sz="2000" b="1" dirty="0"/>
+              <a:t>Polling point</a:t>
+            </a:r>
+            <a:r>
               <a:rPr lang="en-US" altLang="zh-CN" sz="2000" dirty="0"/>
-              <a:t>Polling point: The executor reaches the polling point when it needs to select the next instance to execute but no instance is currently available.</a:t>
-            </a:r>
-            <a:r>
-              <a:rPr lang="zh-CN" altLang="en-US" sz="2000" dirty="0"/>
+              <a:t>: </a:t>
+            </a:r>
+            <a:r>
+              <a:rPr lang="en-US" altLang="zh-CN" sz="1800" dirty="0"/>
+              <a:t>The executor reaches the polling point when it needs to select the next instance to execute but no instance is currently available.</a:t>
+            </a:r>
+            <a:r>
+              <a:rPr lang="zh-CN" altLang="en-US" sz="1800" dirty="0"/>
               <a:t> </a:t>
             </a:r>
             <a:endParaRPr lang="zh-CN" altLang="en-US" sz="2000" dirty="0"/>
           </a:p>
           <a:p>
             <a:r>
+              <a:rPr lang="en-US" altLang="zh-CN" sz="2000" b="1" dirty="0"/>
+              <a:t>Processing window</a:t>
+            </a:r>
+            <a:r>
               <a:rPr lang="en-US" altLang="zh-CN" sz="2000" dirty="0"/>
-              <a:t>Processing window: between two polling points.</a:t>
+              <a:t>: between two polling points.</a:t>
             </a:r>
             <a:endParaRPr lang="en-US" altLang="zh-CN" sz="2000" dirty="0"/>
           </a:p>
           <a:p>
             <a:r>
-              <a:rPr lang="en-US" altLang="zh-CN" sz="2000" dirty="0"/>
+              <a:rPr lang="en-US" altLang="zh-CN" sz="2000" b="1" dirty="0"/>
               <a:t>Single-threaded executor process</a:t>
             </a:r>
-            <a:endParaRPr lang="en-US" altLang="zh-CN" sz="2000" dirty="0"/>
+            <a:endParaRPr lang="en-US" altLang="zh-CN" sz="2000" b="1" dirty="0"/>
           </a:p>
           <a:p>
             <a:pPr lvl="1"/>
@@ -3373,18 +6207,38 @@
           <a:p>
             <a:pPr lvl="1"/>
             <a:r>
+              <a:rPr lang="en-US" altLang="zh-CN" sz="1600" b="1" dirty="0">
+                <a:solidFill>
+                  <a:schemeClr val="accent1"/>
+                </a:solidFill>
+              </a:rPr>
+              <a:t>The timer callback does not need to wait for the polling point, only needs to wait for the scheduled arrival</a:t>
+            </a:r>
+            <a:endParaRPr lang="en-US" altLang="zh-CN" sz="1600" b="1" dirty="0">
+              <a:solidFill>
+                <a:schemeClr val="accent1"/>
+              </a:solidFill>
+            </a:endParaRPr>
+          </a:p>
+          <a:p>
+            <a:pPr lvl="1"/>
+            <a:r>
               <a:rPr lang="en-US" altLang="zh-CN" sz="1600" dirty="0"/>
-              <a:t>The timer callback does not need to wait for the polling point, only needs to wait for the scheduled arrival</a:t>
-            </a:r>
-            <a:endParaRPr lang="en-US" altLang="zh-CN" sz="1600" dirty="0"/>
-          </a:p>
-          <a:p>
-            <a:pPr lvl="1"/>
-            <a:r>
-              <a:rPr lang="en-US" altLang="zh-CN" sz="1600" dirty="0"/>
-              <a:t>In a poll, only the first instance of the callback is processed</a:t>
-            </a:r>
-            <a:endParaRPr lang="en-US" altLang="zh-CN" sz="1600" dirty="0"/>
+              <a:t>In a processing window, </a:t>
+            </a:r>
+            <a:r>
+              <a:rPr lang="en-US" altLang="zh-CN" sz="1600" b="1" dirty="0">
+                <a:solidFill>
+                  <a:schemeClr val="accent1"/>
+                </a:solidFill>
+              </a:rPr>
+              <a:t>only the first instance of the callback is processed</a:t>
+            </a:r>
+            <a:endParaRPr lang="en-US" altLang="zh-CN" sz="1600" b="1" dirty="0">
+              <a:solidFill>
+                <a:schemeClr val="accent1"/>
+              </a:solidFill>
+            </a:endParaRPr>
           </a:p>
           <a:p>
             <a:pPr lvl="1"/>
@@ -3533,7 +6387,11 @@
               <a:p>
                 <a:r>
                   <a:rPr lang="en-US" altLang="zh-CN" sz="2000" dirty="0"/>
-                  <a:t>The triggering relationship between callbacks constitutes the callback chain</a:t>
+                  <a:t>The triggering relationship between callbacks constitutes the </a:t>
+                </a:r>
+                <a:r>
+                  <a:rPr lang="en-US" altLang="zh-CN" sz="2000" b="1" dirty="0"/>
+                  <a:t>callback chain</a:t>
                 </a:r>
                 <a:endParaRPr lang="en-US" altLang="zh-CN" sz="2000" dirty="0"/>
               </a:p>
@@ -5291,4 +8149,263 @@
     </a:ext>
   </a:extLst>
 </a:theme>
+</file>
+
+<file path=ppt/theme/theme2.xml><?xml version="1.0" encoding="utf-8"?>
+<a:theme xmlns:a="http://schemas.openxmlformats.org/drawingml/2006/main" name="1_Office 主题​​">
+  <a:themeElements>
+    <a:clrScheme name="Office">
+      <a:dk1>
+        <a:sysClr val="windowText" lastClr="000000"/>
+      </a:dk1>
+      <a:lt1>
+        <a:sysClr val="window" lastClr="FFFFFF"/>
+      </a:lt1>
+      <a:dk2>
+        <a:srgbClr val="44546A"/>
+      </a:dk2>
+      <a:lt2>
+        <a:srgbClr val="E7E6E6"/>
+      </a:lt2>
+      <a:accent1>
+        <a:srgbClr val="4472C4"/>
+      </a:accent1>
+      <a:accent2>
+        <a:srgbClr val="ED7D31"/>
+      </a:accent2>
+      <a:accent3>
+        <a:srgbClr val="A5A5A5"/>
+      </a:accent3>
+      <a:accent4>
+        <a:srgbClr val="FFC000"/>
+      </a:accent4>
+      <a:accent5>
+        <a:srgbClr val="5B9BD5"/>
+      </a:accent5>
+      <a:accent6>
+        <a:srgbClr val="70AD47"/>
+      </a:accent6>
+      <a:hlink>
+        <a:srgbClr val="0563C1"/>
+      </a:hlink>
+      <a:folHlink>
+        <a:srgbClr val="954F72"/>
+      </a:folHlink>
+    </a:clrScheme>
+    <a:fontScheme name="Office">
+      <a:majorFont>
+        <a:latin typeface="等线 Light"/>
+        <a:ea typeface=""/>
+        <a:cs typeface=""/>
+        <a:font script="Jpan" typeface="游ゴシック Light"/>
+        <a:font script="Hang" typeface="맑은 고딕"/>
+        <a:font script="Hans" typeface="等线 Light"/>
+        <a:font script="Hant" typeface="新細明體"/>
+        <a:font script="Arab" typeface="Times New Roman"/>
+        <a:font script="Hebr" typeface="Times New Roman"/>
+        <a:font script="Thai" typeface="Angsana New"/>
+        <a:font script="Ethi" typeface="Nyala"/>
+        <a:font script="Beng" typeface="Vrinda"/>
+        <a:font script="Gujr" typeface="Shruti"/>
+        <a:font script="Khmr" typeface="MoolBoran"/>
+        <a:font script="Knda" typeface="Tunga"/>
+        <a:font script="Guru" typeface="Raavi"/>
+        <a:font script="Cans" typeface="Euphemia"/>
+        <a:font script="Cher" typeface="Plantagenet Cherokee"/>
+        <a:font script="Yiii" typeface="Microsoft Yi Baiti"/>
+        <a:font script="Tibt" typeface="Microsoft Himalaya"/>
+        <a:font script="Thaa" typeface="MV Boli"/>
+        <a:font script="Deva" typeface="Mangal"/>
+        <a:font script="Telu" typeface="Gautami"/>
+        <a:font script="Taml" typeface="Latha"/>
+        <a:font script="Syrc" typeface="Estrangelo Edessa"/>
+        <a:font script="Orya" typeface="Kalinga"/>
+        <a:font script="Mlym" typeface="Kartika"/>
+        <a:font script="Laoo" typeface="DokChampa"/>
+        <a:font script="Sinh" typeface="Iskoola Pota"/>
+        <a:font script="Mong" typeface="Mongolian Baiti"/>
+        <a:font script="Viet" typeface="Times New Roman"/>
+        <a:font script="Uigh" typeface="Microsoft Uighur"/>
+        <a:font script="Geor" typeface="Sylfaen"/>
+      </a:majorFont>
+      <a:minorFont>
+        <a:latin typeface="等线"/>
+        <a:ea typeface=""/>
+        <a:cs typeface=""/>
+        <a:font script="Jpan" typeface="游ゴシック"/>
+        <a:font script="Hang" typeface="맑은 고딕"/>
+        <a:font script="Hans" typeface="等线"/>
+        <a:font script="Hant" typeface="新細明體"/>
+        <a:font script="Arab" typeface="Arial"/>
+        <a:font script="Hebr" typeface="Arial"/>
+        <a:font script="Thai" typeface="Cordia New"/>
+        <a:font script="Ethi" typeface="Nyala"/>
+        <a:font script="Beng" typeface="Vrinda"/>
+        <a:font script="Gujr" typeface="Shruti"/>
+        <a:font script="Khmr" typeface="DaunPenh"/>
+        <a:font script="Knda" typeface="Tunga"/>
+        <a:font script="Guru" typeface="Raavi"/>
+        <a:font script="Cans" typeface="Euphemia"/>
+        <a:font script="Cher" typeface="Plantagenet Cherokee"/>
+        <a:font script="Yiii" typeface="Microsoft Yi Baiti"/>
+        <a:font script="Tibt" typeface="Microsoft Himalaya"/>
+        <a:font script="Thaa" typeface="MV Boli"/>
+        <a:font script="Deva" typeface="Mangal"/>
+        <a:font script="Telu" typeface="Gautami"/>
+        <a:font script="Taml" typeface="Latha"/>
+        <a:font script="Syrc" typeface="Estrangelo Edessa"/>
+        <a:font script="Orya" typeface="Kalinga"/>
+        <a:font script="Mlym" typeface="Kartika"/>
+        <a:font script="Laoo" typeface="DokChampa"/>
+        <a:font script="Sinh" typeface="Iskoola Pota"/>
+        <a:font script="Mong" typeface="Mongolian Baiti"/>
+        <a:font script="Viet" typeface="Arial"/>
+        <a:font script="Uigh" typeface="Microsoft Uighur"/>
+        <a:font script="Geor" typeface="Sylfaen"/>
+      </a:minorFont>
+    </a:fontScheme>
+    <a:fmtScheme name="Office">
+      <a:fillStyleLst>
+        <a:solidFill>
+          <a:schemeClr val="phClr"/>
+        </a:solidFill>
+        <a:gradFill rotWithShape="1">
+          <a:gsLst>
+            <a:gs pos="0">
+              <a:schemeClr val="phClr">
+                <a:lumMod val="110000"/>
+                <a:satMod val="105000"/>
+                <a:tint val="67000"/>
+              </a:schemeClr>
+            </a:gs>
+            <a:gs pos="50000">
+              <a:schemeClr val="phClr">
+                <a:lumMod val="105000"/>
+                <a:satMod val="103000"/>
+                <a:tint val="73000"/>
+              </a:schemeClr>
+            </a:gs>
+            <a:gs pos="100000">
+              <a:schemeClr val="phClr">
+                <a:lumMod val="105000"/>
+                <a:satMod val="109000"/>
+                <a:tint val="81000"/>
+              </a:schemeClr>
+            </a:gs>
+          </a:gsLst>
+          <a:lin ang="5400000" scaled="0"/>
+        </a:gradFill>
+        <a:gradFill rotWithShape="1">
+          <a:gsLst>
+            <a:gs pos="0">
+              <a:schemeClr val="phClr">
+                <a:satMod val="103000"/>
+                <a:lumMod val="102000"/>
+                <a:tint val="94000"/>
+              </a:schemeClr>
+            </a:gs>
+            <a:gs pos="50000">
+              <a:schemeClr val="phClr">
+                <a:satMod val="110000"/>
+                <a:lumMod val="100000"/>
+                <a:shade val="100000"/>
+              </a:schemeClr>
+            </a:gs>
+            <a:gs pos="100000">
+              <a:schemeClr val="phClr">
+                <a:lumMod val="99000"/>
+                <a:satMod val="120000"/>
+                <a:shade val="78000"/>
+              </a:schemeClr>
+            </a:gs>
+          </a:gsLst>
+          <a:lin ang="5400000" scaled="0"/>
+        </a:gradFill>
+      </a:fillStyleLst>
+      <a:lnStyleLst>
+        <a:ln w="6350" cap="flat" cmpd="sng" algn="ctr">
+          <a:solidFill>
+            <a:schemeClr val="phClr"/>
+          </a:solidFill>
+          <a:prstDash val="solid"/>
+          <a:miter lim="800000"/>
+        </a:ln>
+        <a:ln w="12700" cap="flat" cmpd="sng" algn="ctr">
+          <a:solidFill>
+            <a:schemeClr val="phClr"/>
+          </a:solidFill>
+          <a:prstDash val="solid"/>
+          <a:miter lim="800000"/>
+        </a:ln>
+        <a:ln w="19050" cap="flat" cmpd="sng" algn="ctr">
+          <a:solidFill>
+            <a:schemeClr val="phClr"/>
+          </a:solidFill>
+          <a:prstDash val="solid"/>
+          <a:miter lim="800000"/>
+        </a:ln>
+      </a:lnStyleLst>
+      <a:effectStyleLst>
+        <a:effectStyle>
+          <a:effectLst/>
+        </a:effectStyle>
+        <a:effectStyle>
+          <a:effectLst/>
+        </a:effectStyle>
+        <a:effectStyle>
+          <a:effectLst>
+            <a:outerShdw blurRad="57150" dist="19050" dir="5400000" algn="ctr" rotWithShape="0">
+              <a:srgbClr val="000000">
+                <a:alpha val="63000"/>
+              </a:srgbClr>
+            </a:outerShdw>
+          </a:effectLst>
+        </a:effectStyle>
+      </a:effectStyleLst>
+      <a:bgFillStyleLst>
+        <a:solidFill>
+          <a:schemeClr val="phClr"/>
+        </a:solidFill>
+        <a:solidFill>
+          <a:schemeClr val="phClr">
+            <a:tint val="95000"/>
+            <a:satMod val="170000"/>
+          </a:schemeClr>
+        </a:solidFill>
+        <a:gradFill rotWithShape="1">
+          <a:gsLst>
+            <a:gs pos="0">
+              <a:schemeClr val="phClr">
+                <a:tint val="93000"/>
+                <a:satMod val="150000"/>
+                <a:shade val="98000"/>
+                <a:lumMod val="102000"/>
+              </a:schemeClr>
+            </a:gs>
+            <a:gs pos="50000">
+              <a:schemeClr val="phClr">
+                <a:tint val="98000"/>
+                <a:satMod val="130000"/>
+                <a:shade val="90000"/>
+                <a:lumMod val="103000"/>
+              </a:schemeClr>
+            </a:gs>
+            <a:gs pos="100000">
+              <a:schemeClr val="phClr">
+                <a:shade val="63000"/>
+                <a:satMod val="120000"/>
+              </a:schemeClr>
+            </a:gs>
+          </a:gsLst>
+          <a:lin ang="5400000" scaled="0"/>
+        </a:gradFill>
+      </a:bgFillStyleLst>
+    </a:fmtScheme>
+  </a:themeElements>
+  <a:extLst>
+    <a:ext uri="{05A4C25C-085E-4340-85A3-A5531E510DB2}">
+      <thm15:themeFamily xmlns:thm15="http://schemas.microsoft.com/office/thememl/2012/main" name="Office Theme" id="{62F939B6-93AF-4DB8-9C6B-D6C7DFDC589F}" vid="{4A3C46E8-61CC-4603-A589-7422A47A8E4A}"/>
+    </a:ext>
+  </a:extLst>
+</a:theme>
 </file>
</xml_diff>

<commit_message>
vault backup: 2024-05-24 13:38:15
</commit_message>
<xml_diff>
--- a/06-ppt/discussion/0524.pptx
+++ b/06-ppt/discussion/0524.pptx
@@ -119,7 +119,7 @@
   <p:extLst>
     <p:ext uri="{EFAFB233-063F-42B5-8137-9DF3F51BA10A}">
       <p15:sldGuideLst xmlns:p15="http://schemas.microsoft.com/office/powerpoint/2012/main">
-        <p15:guide id="1" orient="horz" pos="2160" userDrawn="1">
+        <p15:guide id="1" orient="horz" pos="2174" userDrawn="1">
           <p15:clr>
             <a:srgbClr val="A4A3A4"/>
           </p15:clr>
@@ -5946,9 +5946,13 @@
             <a:pPr lvl="1"/>
             <a:r>
               <a:rPr lang="en-US" altLang="zh-CN" sz="1600" b="1" dirty="0"/>
-              <a:t>Can only be assigned to the only executor</a:t>
-            </a:r>
-            <a:endParaRPr lang="en-US" altLang="zh-CN" sz="1600" b="1" dirty="0"/>
+              <a:t>Can only running </a:t>
+            </a:r>
+            <a:r>
+              <a:rPr lang="en-US" altLang="zh-CN" sz="1600" b="1" dirty="0"/>
+              <a:t>on the only executor</a:t>
+            </a:r>
+            <a:endParaRPr lang="en-US" altLang="zh-CN" sz="1330" b="1" dirty="0"/>
           </a:p>
           <a:p>
             <a:pPr lvl="1"/>
@@ -6398,7 +6402,7 @@
               <a:p>
                 <a:r>
                   <a:rPr lang="en-US" altLang="zh-CN" sz="2000" dirty="0"/>
-                  <a:t>A callback chain can exist within a single executor or node, or span multiple executors.</a:t>
+                  <a:t>A callback chain can exist within a single executor, or span multiple executors.</a:t>
                 </a:r>
                 <a:endParaRPr lang="en-US" altLang="zh-CN" sz="2000" dirty="0"/>
               </a:p>
@@ -6406,7 +6410,17 @@
                 <a:pPr lvl="1"/>
                 <a:r>
                   <a:rPr lang="en-US" altLang="zh-CN" sz="1600" dirty="0"/>
-                  <a:t>Similar to a chain of tasks (callbacks) scheduled on a single or multiple cores (single or multiple executors), instances of tasks are similar to instances of callbacks</a:t>
+                  <a:t>Similar to a chain of tasks (callbacks) scheduled on a single or multiple cores (single-threaded or </a:t>
+                </a:r>
+                <a:r>
+                  <a:rPr lang="en-US" altLang="zh-CN" sz="1600" dirty="0">
+                    <a:sym typeface="+mn-ea"/>
+                  </a:rPr>
+                  <a:t>Multi-threaded </a:t>
+                </a:r>
+                <a:r>
+                  <a:rPr lang="en-US" altLang="zh-CN" sz="1600" dirty="0"/>
+                  <a:t>executor), instances of tasks are similar to instances of callbacks</a:t>
                 </a:r>
                 <a:endParaRPr lang="en-US" altLang="zh-CN" sz="1600" dirty="0"/>
               </a:p>

</xml_diff>

<commit_message>
vault backup: 2024-05-24 13:58:30
</commit_message>
<xml_diff>
--- a/06-ppt/discussion/0524.pptx
+++ b/06-ppt/discussion/0524.pptx
@@ -7823,9 +7823,6 @@
             <a:endParaRPr lang="en-US" altLang="zh-CN" sz="1600" dirty="0"/>
           </a:p>
           <a:p>
-            <a:endParaRPr lang="en-US" altLang="zh-CN" sz="2400" dirty="0"/>
-          </a:p>
-          <a:p>
             <a:r>
               <a:rPr lang="en-US" altLang="zh-CN" sz="2000" dirty="0"/>
               <a:t>Analysis based on message synchronization</a:t>
@@ -7881,6 +7878,36 @@
             <a:r>
               <a:rPr lang="en-US" altLang="zh-CN" sz="1400" dirty="0"/>
               <a:t>	</a:t>
+            </a:r>
+            <a:endParaRPr lang="en-US" altLang="zh-CN" sz="1400" dirty="0"/>
+          </a:p>
+          <a:p>
+            <a:pPr lvl="0"/>
+            <a:r>
+              <a:rPr lang="en-US" altLang="zh-CN" sz="1960" dirty="0">
+                <a:sym typeface="+mn-ea"/>
+              </a:rPr>
+              <a:t>Analysis based on m</a:t>
+            </a:r>
+            <a:r>
+              <a:rPr lang="en-US" altLang="zh-CN" sz="1960" dirty="0">
+                <a:sym typeface="+mn-ea"/>
+              </a:rPr>
+              <a:t>ulti-threaded </a:t>
+            </a:r>
+            <a:r>
+              <a:rPr lang="en-US" altLang="zh-CN" sz="1960" dirty="0">
+                <a:sym typeface="+mn-ea"/>
+              </a:rPr>
+              <a:t>executor</a:t>
+            </a:r>
+            <a:endParaRPr lang="en-US" altLang="zh-CN" sz="1960" dirty="0"/>
+          </a:p>
+          <a:p>
+            <a:pPr lvl="2"/>
+            <a:r>
+              <a:rPr lang="en-US" altLang="zh-CN" sz="1400" dirty="0"/>
+              <a:t>RTeX：用于 ROS 2 的高效且时序可预测的多线程执行器</a:t>
             </a:r>
             <a:endParaRPr lang="en-US" altLang="zh-CN" sz="1400" dirty="0"/>
           </a:p>

</xml_diff>

<commit_message>
vault backup: 2024-05-24 14:19:49
</commit_message>
<xml_diff>
--- a/06-ppt/discussion/0524.pptx
+++ b/06-ppt/discussion/0524.pptx
@@ -7791,6 +7791,14 @@
             <a:endParaRPr lang="en-US" altLang="zh-CN" sz="1600" dirty="0"/>
           </a:p>
           <a:p>
+            <a:pPr lvl="2"/>
+            <a:r>
+              <a:rPr lang="en-US" altLang="zh-CN" sz="1600" dirty="0"/>
+              <a:t>Response Time Analysis for Dynamic Priority Scheduling in ROS2</a:t>
+            </a:r>
+            <a:endParaRPr lang="en-US" altLang="zh-CN" sz="1600" dirty="0"/>
+          </a:p>
+          <a:p>
             <a:pPr lvl="1"/>
             <a:r>
               <a:rPr lang="en-US" altLang="zh-CN" sz="2000" dirty="0"/>
@@ -7907,7 +7915,7 @@
             <a:pPr lvl="2"/>
             <a:r>
               <a:rPr lang="en-US" altLang="zh-CN" sz="1400" dirty="0"/>
-              <a:t>RTeX：用于 ROS 2 的高效且时序可预测的多线程执行器</a:t>
+              <a:t>RTeX: an Efficient and Timing-Predictable Multi-threaded Executor for ROS 2</a:t>
             </a:r>
             <a:endParaRPr lang="en-US" altLang="zh-CN" sz="1400" dirty="0"/>
           </a:p>

</xml_diff>